<commit_message>
Updating several Powerpoints and adding new ones
</commit_message>
<xml_diff>
--- a/powerpoints/Day_13.pptx
+++ b/powerpoints/Day_13.pptx
@@ -5,7 +5,7 @@
     <p:sldMasterId id="2147483661" r:id="rId1"/>
   </p:sldMasterIdLst>
   <p:notesMasterIdLst>
-    <p:notesMasterId r:id="rId14"/>
+    <p:notesMasterId r:id="rId19"/>
   </p:notesMasterIdLst>
   <p:sldIdLst>
     <p:sldId id="256" r:id="rId2"/>
@@ -16,10 +16,15 @@
     <p:sldId id="266" r:id="rId7"/>
     <p:sldId id="281" r:id="rId8"/>
     <p:sldId id="282" r:id="rId9"/>
-    <p:sldId id="283" r:id="rId10"/>
-    <p:sldId id="271" r:id="rId11"/>
-    <p:sldId id="272" r:id="rId12"/>
-    <p:sldId id="267" r:id="rId13"/>
+    <p:sldId id="296" r:id="rId10"/>
+    <p:sldId id="283" r:id="rId11"/>
+    <p:sldId id="298" r:id="rId12"/>
+    <p:sldId id="271" r:id="rId13"/>
+    <p:sldId id="272" r:id="rId14"/>
+    <p:sldId id="299" r:id="rId15"/>
+    <p:sldId id="261" r:id="rId16"/>
+    <p:sldId id="304" r:id="rId17"/>
+    <p:sldId id="267" r:id="rId18"/>
   </p:sldIdLst>
   <p:sldSz cx="9144000" cy="6858000" type="screen4x3"/>
   <p:notesSz cx="7010400" cy="9296400"/>
@@ -2074,6 +2079,110 @@
 </p:notes>
 </file>
 
+<file path=ppt/notesSlides/notesSlide10.xml><?xml version="1.0" encoding="utf-8"?>
+<p:notes xmlns:a="http://schemas.openxmlformats.org/drawingml/2006/main" xmlns:r="http://schemas.openxmlformats.org/officeDocument/2006/relationships" xmlns:p="http://schemas.openxmlformats.org/presentationml/2006/main" showMasterSp="0" showMasterPhAnim="0">
+  <p:cSld>
+    <p:spTree>
+      <p:nvGrpSpPr>
+        <p:cNvPr id="1" name="Shape 283"/>
+        <p:cNvGrpSpPr/>
+        <p:nvPr/>
+      </p:nvGrpSpPr>
+      <p:grpSpPr>
+        <a:xfrm>
+          <a:off x="0" y="0"/>
+          <a:ext cx="0" cy="0"/>
+          <a:chOff x="0" y="0"/>
+          <a:chExt cx="0" cy="0"/>
+        </a:xfrm>
+      </p:grpSpPr>
+      <p:sp>
+        <p:nvSpPr>
+          <p:cNvPr id="284" name="Google Shape;284;p12:notes"/>
+          <p:cNvSpPr txBox="1">
+            <a:spLocks noGrp="1"/>
+          </p:cNvSpPr>
+          <p:nvPr>
+            <p:ph type="body" idx="1"/>
+          </p:nvPr>
+        </p:nvSpPr>
+        <p:spPr>
+          <a:xfrm>
+            <a:off x="701040" y="4415790"/>
+            <a:ext cx="5608320" cy="4183380"/>
+          </a:xfrm>
+          <a:prstGeom prst="rect">
+            <a:avLst/>
+          </a:prstGeom>
+        </p:spPr>
+        <p:txBody>
+          <a:bodyPr spcFirstLastPara="1" wrap="square" lIns="93150" tIns="46575" rIns="93150" bIns="46575" anchor="t" anchorCtr="0">
+            <a:noAutofit/>
+          </a:bodyPr>
+          <a:lstStyle/>
+          <a:p>
+            <a:pPr marL="0" lvl="0" indent="0" algn="l" rtl="0">
+              <a:spcBef>
+                <a:spcPts val="0"/>
+              </a:spcBef>
+              <a:spcAft>
+                <a:spcPts val="0"/>
+              </a:spcAft>
+              <a:buNone/>
+            </a:pPr>
+            <a:endParaRPr/>
+          </a:p>
+        </p:txBody>
+      </p:sp>
+      <p:sp>
+        <p:nvSpPr>
+          <p:cNvPr id="285" name="Google Shape;285;p12:notes"/>
+          <p:cNvSpPr>
+            <a:spLocks noGrp="1" noRot="1" noChangeAspect="1"/>
+          </p:cNvSpPr>
+          <p:nvPr>
+            <p:ph type="sldImg" idx="2"/>
+          </p:nvPr>
+        </p:nvSpPr>
+        <p:spPr>
+          <a:xfrm>
+            <a:off x="1181100" y="696913"/>
+            <a:ext cx="4648200" cy="3486150"/>
+          </a:xfrm>
+          <a:custGeom>
+            <a:avLst/>
+            <a:gdLst/>
+            <a:ahLst/>
+            <a:cxnLst/>
+            <a:rect l="l" t="t" r="r" b="b"/>
+            <a:pathLst>
+              <a:path w="120000" h="120000" extrusionOk="0">
+                <a:moveTo>
+                  <a:pt x="0" y="0"/>
+                </a:moveTo>
+                <a:lnTo>
+                  <a:pt x="120000" y="0"/>
+                </a:lnTo>
+                <a:lnTo>
+                  <a:pt x="120000" y="120000"/>
+                </a:lnTo>
+                <a:lnTo>
+                  <a:pt x="0" y="120000"/>
+                </a:lnTo>
+                <a:close/>
+              </a:path>
+            </a:pathLst>
+          </a:custGeom>
+        </p:spPr>
+      </p:sp>
+    </p:spTree>
+  </p:cSld>
+  <p:clrMapOvr>
+    <a:masterClrMapping/>
+  </p:clrMapOvr>
+</p:notes>
+</file>
+
 <file path=ppt/notesSlides/notesSlide2.xml><?xml version="1.0" encoding="utf-8"?>
 <p:notes xmlns:a="http://schemas.openxmlformats.org/drawingml/2006/main" xmlns:r="http://schemas.openxmlformats.org/officeDocument/2006/relationships" xmlns:p="http://schemas.openxmlformats.org/presentationml/2006/main" showMasterSp="0" showMasterPhAnim="0">
   <p:cSld>
@@ -2391,7 +2500,7 @@
   <p:cSld>
     <p:spTree>
       <p:nvGrpSpPr>
-        <p:cNvPr id="1" name="Shape 283"/>
+        <p:cNvPr id="1" name="Shape 221"/>
         <p:cNvGrpSpPr/>
         <p:nvPr/>
       </p:nvGrpSpPr>
@@ -2405,7 +2514,7 @@
       </p:grpSpPr>
       <p:sp>
         <p:nvSpPr>
-          <p:cNvPr id="284" name="Google Shape;284;p12:notes"/>
+          <p:cNvPr id="222" name="Google Shape;222;p3:notes"/>
           <p:cNvSpPr txBox="1">
             <a:spLocks noGrp="1"/>
           </p:cNvSpPr>
@@ -2443,7 +2552,7 @@
       </p:sp>
       <p:sp>
         <p:nvSpPr>
-          <p:cNvPr id="285" name="Google Shape;285;p12:notes"/>
+          <p:cNvPr id="223" name="Google Shape;223;p3:notes"/>
           <p:cNvSpPr>
             <a:spLocks noGrp="1" noRot="1" noChangeAspect="1"/>
           </p:cNvSpPr>
@@ -2483,6 +2592,432 @@
         </p:spPr>
       </p:sp>
     </p:spTree>
+  </p:cSld>
+  <p:clrMapOvr>
+    <a:masterClrMapping/>
+  </p:clrMapOvr>
+</p:notes>
+</file>
+
+<file path=ppt/notesSlides/notesSlide6.xml><?xml version="1.0" encoding="utf-8"?>
+<p:notes xmlns:a="http://schemas.openxmlformats.org/drawingml/2006/main" xmlns:r="http://schemas.openxmlformats.org/officeDocument/2006/relationships" xmlns:p="http://schemas.openxmlformats.org/presentationml/2006/main" showMasterSp="0" showMasterPhAnim="0">
+  <p:cSld>
+    <p:spTree>
+      <p:nvGrpSpPr>
+        <p:cNvPr id="1" name="Shape 228"/>
+        <p:cNvGrpSpPr/>
+        <p:nvPr/>
+      </p:nvGrpSpPr>
+      <p:grpSpPr>
+        <a:xfrm>
+          <a:off x="0" y="0"/>
+          <a:ext cx="0" cy="0"/>
+          <a:chOff x="0" y="0"/>
+          <a:chExt cx="0" cy="0"/>
+        </a:xfrm>
+      </p:grpSpPr>
+      <p:sp>
+        <p:nvSpPr>
+          <p:cNvPr id="229" name="Google Shape;229;p4:notes"/>
+          <p:cNvSpPr txBox="1">
+            <a:spLocks noGrp="1"/>
+          </p:cNvSpPr>
+          <p:nvPr>
+            <p:ph type="body" idx="1"/>
+          </p:nvPr>
+        </p:nvSpPr>
+        <p:spPr>
+          <a:xfrm>
+            <a:off x="701040" y="4415790"/>
+            <a:ext cx="5608320" cy="4183380"/>
+          </a:xfrm>
+          <a:prstGeom prst="rect">
+            <a:avLst/>
+          </a:prstGeom>
+        </p:spPr>
+        <p:txBody>
+          <a:bodyPr spcFirstLastPara="1" wrap="square" lIns="93150" tIns="46575" rIns="93150" bIns="46575" anchor="t" anchorCtr="0">
+            <a:noAutofit/>
+          </a:bodyPr>
+          <a:lstStyle/>
+          <a:p>
+            <a:pPr marL="0" lvl="0" indent="0" algn="l" rtl="0">
+              <a:spcBef>
+                <a:spcPts val="0"/>
+              </a:spcBef>
+              <a:spcAft>
+                <a:spcPts val="0"/>
+              </a:spcAft>
+              <a:buNone/>
+            </a:pPr>
+            <a:endParaRPr/>
+          </a:p>
+        </p:txBody>
+      </p:sp>
+      <p:sp>
+        <p:nvSpPr>
+          <p:cNvPr id="230" name="Google Shape;230;p4:notes"/>
+          <p:cNvSpPr>
+            <a:spLocks noGrp="1" noRot="1" noChangeAspect="1"/>
+          </p:cNvSpPr>
+          <p:nvPr>
+            <p:ph type="sldImg" idx="2"/>
+          </p:nvPr>
+        </p:nvSpPr>
+        <p:spPr>
+          <a:xfrm>
+            <a:off x="1181100" y="696913"/>
+            <a:ext cx="4648200" cy="3486150"/>
+          </a:xfrm>
+          <a:custGeom>
+            <a:avLst/>
+            <a:gdLst/>
+            <a:ahLst/>
+            <a:cxnLst/>
+            <a:rect l="l" t="t" r="r" b="b"/>
+            <a:pathLst>
+              <a:path w="120000" h="120000" extrusionOk="0">
+                <a:moveTo>
+                  <a:pt x="0" y="0"/>
+                </a:moveTo>
+                <a:lnTo>
+                  <a:pt x="120000" y="0"/>
+                </a:lnTo>
+                <a:lnTo>
+                  <a:pt x="120000" y="120000"/>
+                </a:lnTo>
+                <a:lnTo>
+                  <a:pt x="0" y="120000"/>
+                </a:lnTo>
+                <a:close/>
+              </a:path>
+            </a:pathLst>
+          </a:custGeom>
+        </p:spPr>
+      </p:sp>
+    </p:spTree>
+    <p:extLst>
+      <p:ext uri="{BB962C8B-B14F-4D97-AF65-F5344CB8AC3E}">
+        <p14:creationId xmlns:p14="http://schemas.microsoft.com/office/powerpoint/2010/main" val="1767913342"/>
+      </p:ext>
+    </p:extLst>
+  </p:cSld>
+  <p:clrMapOvr>
+    <a:masterClrMapping/>
+  </p:clrMapOvr>
+</p:notes>
+</file>
+
+<file path=ppt/notesSlides/notesSlide7.xml><?xml version="1.0" encoding="utf-8"?>
+<p:notes xmlns:a="http://schemas.openxmlformats.org/drawingml/2006/main" xmlns:r="http://schemas.openxmlformats.org/officeDocument/2006/relationships" xmlns:p="http://schemas.openxmlformats.org/presentationml/2006/main" showMasterSp="0" showMasterPhAnim="0">
+  <p:cSld>
+    <p:spTree>
+      <p:nvGrpSpPr>
+        <p:cNvPr id="1" name="Shape 235"/>
+        <p:cNvGrpSpPr/>
+        <p:nvPr/>
+      </p:nvGrpSpPr>
+      <p:grpSpPr>
+        <a:xfrm>
+          <a:off x="0" y="0"/>
+          <a:ext cx="0" cy="0"/>
+          <a:chOff x="0" y="0"/>
+          <a:chExt cx="0" cy="0"/>
+        </a:xfrm>
+      </p:grpSpPr>
+      <p:sp>
+        <p:nvSpPr>
+          <p:cNvPr id="236" name="Google Shape;236;p5:notes"/>
+          <p:cNvSpPr txBox="1">
+            <a:spLocks noGrp="1"/>
+          </p:cNvSpPr>
+          <p:nvPr>
+            <p:ph type="body" idx="1"/>
+          </p:nvPr>
+        </p:nvSpPr>
+        <p:spPr>
+          <a:xfrm>
+            <a:off x="701040" y="4415790"/>
+            <a:ext cx="5608320" cy="4183380"/>
+          </a:xfrm>
+          <a:prstGeom prst="rect">
+            <a:avLst/>
+          </a:prstGeom>
+        </p:spPr>
+        <p:txBody>
+          <a:bodyPr spcFirstLastPara="1" wrap="square" lIns="93150" tIns="46575" rIns="93150" bIns="46575" anchor="t" anchorCtr="0">
+            <a:noAutofit/>
+          </a:bodyPr>
+          <a:lstStyle/>
+          <a:p>
+            <a:pPr marL="0" lvl="0" indent="0" algn="l" rtl="0">
+              <a:spcBef>
+                <a:spcPts val="0"/>
+              </a:spcBef>
+              <a:spcAft>
+                <a:spcPts val="0"/>
+              </a:spcAft>
+              <a:buNone/>
+            </a:pPr>
+            <a:endParaRPr/>
+          </a:p>
+        </p:txBody>
+      </p:sp>
+      <p:sp>
+        <p:nvSpPr>
+          <p:cNvPr id="237" name="Google Shape;237;p5:notes"/>
+          <p:cNvSpPr>
+            <a:spLocks noGrp="1" noRot="1" noChangeAspect="1"/>
+          </p:cNvSpPr>
+          <p:nvPr>
+            <p:ph type="sldImg" idx="2"/>
+          </p:nvPr>
+        </p:nvSpPr>
+        <p:spPr>
+          <a:xfrm>
+            <a:off x="1181100" y="696913"/>
+            <a:ext cx="4648200" cy="3486150"/>
+          </a:xfrm>
+          <a:custGeom>
+            <a:avLst/>
+            <a:gdLst/>
+            <a:ahLst/>
+            <a:cxnLst/>
+            <a:rect l="l" t="t" r="r" b="b"/>
+            <a:pathLst>
+              <a:path w="120000" h="120000" extrusionOk="0">
+                <a:moveTo>
+                  <a:pt x="0" y="0"/>
+                </a:moveTo>
+                <a:lnTo>
+                  <a:pt x="120000" y="0"/>
+                </a:lnTo>
+                <a:lnTo>
+                  <a:pt x="120000" y="120000"/>
+                </a:lnTo>
+                <a:lnTo>
+                  <a:pt x="0" y="120000"/>
+                </a:lnTo>
+                <a:close/>
+              </a:path>
+            </a:pathLst>
+          </a:custGeom>
+        </p:spPr>
+      </p:sp>
+    </p:spTree>
+  </p:cSld>
+  <p:clrMapOvr>
+    <a:masterClrMapping/>
+  </p:clrMapOvr>
+</p:notes>
+</file>
+
+<file path=ppt/notesSlides/notesSlide8.xml><?xml version="1.0" encoding="utf-8"?>
+<p:notes xmlns:a="http://schemas.openxmlformats.org/drawingml/2006/main" xmlns:r="http://schemas.openxmlformats.org/officeDocument/2006/relationships" xmlns:p="http://schemas.openxmlformats.org/presentationml/2006/main" showMasterSp="0" showMasterPhAnim="0">
+  <p:cSld>
+    <p:spTree>
+      <p:nvGrpSpPr>
+        <p:cNvPr id="1" name="Shape 242"/>
+        <p:cNvGrpSpPr/>
+        <p:nvPr/>
+      </p:nvGrpSpPr>
+      <p:grpSpPr>
+        <a:xfrm>
+          <a:off x="0" y="0"/>
+          <a:ext cx="0" cy="0"/>
+          <a:chOff x="0" y="0"/>
+          <a:chExt cx="0" cy="0"/>
+        </a:xfrm>
+      </p:grpSpPr>
+      <p:sp>
+        <p:nvSpPr>
+          <p:cNvPr id="243" name="Google Shape;243;p6:notes"/>
+          <p:cNvSpPr txBox="1">
+            <a:spLocks noGrp="1"/>
+          </p:cNvSpPr>
+          <p:nvPr>
+            <p:ph type="body" idx="1"/>
+          </p:nvPr>
+        </p:nvSpPr>
+        <p:spPr>
+          <a:xfrm>
+            <a:off x="701040" y="4415790"/>
+            <a:ext cx="5608320" cy="4183380"/>
+          </a:xfrm>
+          <a:prstGeom prst="rect">
+            <a:avLst/>
+          </a:prstGeom>
+        </p:spPr>
+        <p:txBody>
+          <a:bodyPr spcFirstLastPara="1" wrap="square" lIns="93150" tIns="46575" rIns="93150" bIns="46575" anchor="t" anchorCtr="0">
+            <a:noAutofit/>
+          </a:bodyPr>
+          <a:lstStyle/>
+          <a:p>
+            <a:pPr marL="0" lvl="0" indent="0" algn="l" rtl="0">
+              <a:spcBef>
+                <a:spcPts val="0"/>
+              </a:spcBef>
+              <a:spcAft>
+                <a:spcPts val="0"/>
+              </a:spcAft>
+              <a:buNone/>
+            </a:pPr>
+            <a:endParaRPr/>
+          </a:p>
+        </p:txBody>
+      </p:sp>
+      <p:sp>
+        <p:nvSpPr>
+          <p:cNvPr id="244" name="Google Shape;244;p6:notes"/>
+          <p:cNvSpPr>
+            <a:spLocks noGrp="1" noRot="1" noChangeAspect="1"/>
+          </p:cNvSpPr>
+          <p:nvPr>
+            <p:ph type="sldImg" idx="2"/>
+          </p:nvPr>
+        </p:nvSpPr>
+        <p:spPr>
+          <a:xfrm>
+            <a:off x="1181100" y="696913"/>
+            <a:ext cx="4648200" cy="3486150"/>
+          </a:xfrm>
+          <a:custGeom>
+            <a:avLst/>
+            <a:gdLst/>
+            <a:ahLst/>
+            <a:cxnLst/>
+            <a:rect l="l" t="t" r="r" b="b"/>
+            <a:pathLst>
+              <a:path w="120000" h="120000" extrusionOk="0">
+                <a:moveTo>
+                  <a:pt x="0" y="0"/>
+                </a:moveTo>
+                <a:lnTo>
+                  <a:pt x="120000" y="0"/>
+                </a:lnTo>
+                <a:lnTo>
+                  <a:pt x="120000" y="120000"/>
+                </a:lnTo>
+                <a:lnTo>
+                  <a:pt x="0" y="120000"/>
+                </a:lnTo>
+                <a:close/>
+              </a:path>
+            </a:pathLst>
+          </a:custGeom>
+        </p:spPr>
+      </p:sp>
+    </p:spTree>
+  </p:cSld>
+  <p:clrMapOvr>
+    <a:masterClrMapping/>
+  </p:clrMapOvr>
+</p:notes>
+</file>
+
+<file path=ppt/notesSlides/notesSlide9.xml><?xml version="1.0" encoding="utf-8"?>
+<p:notes xmlns:a="http://schemas.openxmlformats.org/drawingml/2006/main" xmlns:r="http://schemas.openxmlformats.org/officeDocument/2006/relationships" xmlns:p="http://schemas.openxmlformats.org/presentationml/2006/main" showMasterSp="0" showMasterPhAnim="0">
+  <p:cSld>
+    <p:spTree>
+      <p:nvGrpSpPr>
+        <p:cNvPr id="1" name="Shape 228"/>
+        <p:cNvGrpSpPr/>
+        <p:nvPr/>
+      </p:nvGrpSpPr>
+      <p:grpSpPr>
+        <a:xfrm>
+          <a:off x="0" y="0"/>
+          <a:ext cx="0" cy="0"/>
+          <a:chOff x="0" y="0"/>
+          <a:chExt cx="0" cy="0"/>
+        </a:xfrm>
+      </p:grpSpPr>
+      <p:sp>
+        <p:nvSpPr>
+          <p:cNvPr id="229" name="Google Shape;229;p4:notes"/>
+          <p:cNvSpPr txBox="1">
+            <a:spLocks noGrp="1"/>
+          </p:cNvSpPr>
+          <p:nvPr>
+            <p:ph type="body" idx="1"/>
+          </p:nvPr>
+        </p:nvSpPr>
+        <p:spPr>
+          <a:xfrm>
+            <a:off x="701040" y="4415790"/>
+            <a:ext cx="5608320" cy="4183380"/>
+          </a:xfrm>
+          <a:prstGeom prst="rect">
+            <a:avLst/>
+          </a:prstGeom>
+        </p:spPr>
+        <p:txBody>
+          <a:bodyPr spcFirstLastPara="1" wrap="square" lIns="93150" tIns="46575" rIns="93150" bIns="46575" anchor="t" anchorCtr="0">
+            <a:noAutofit/>
+          </a:bodyPr>
+          <a:lstStyle/>
+          <a:p>
+            <a:pPr marL="0" lvl="0" indent="0" algn="l" rtl="0">
+              <a:spcBef>
+                <a:spcPts val="0"/>
+              </a:spcBef>
+              <a:spcAft>
+                <a:spcPts val="0"/>
+              </a:spcAft>
+              <a:buNone/>
+            </a:pPr>
+            <a:endParaRPr/>
+          </a:p>
+        </p:txBody>
+      </p:sp>
+      <p:sp>
+        <p:nvSpPr>
+          <p:cNvPr id="230" name="Google Shape;230;p4:notes"/>
+          <p:cNvSpPr>
+            <a:spLocks noGrp="1" noRot="1" noChangeAspect="1"/>
+          </p:cNvSpPr>
+          <p:nvPr>
+            <p:ph type="sldImg" idx="2"/>
+          </p:nvPr>
+        </p:nvSpPr>
+        <p:spPr>
+          <a:xfrm>
+            <a:off x="1181100" y="696913"/>
+            <a:ext cx="4648200" cy="3486150"/>
+          </a:xfrm>
+          <a:custGeom>
+            <a:avLst/>
+            <a:gdLst/>
+            <a:ahLst/>
+            <a:cxnLst/>
+            <a:rect l="l" t="t" r="r" b="b"/>
+            <a:pathLst>
+              <a:path w="120000" h="120000" extrusionOk="0">
+                <a:moveTo>
+                  <a:pt x="0" y="0"/>
+                </a:moveTo>
+                <a:lnTo>
+                  <a:pt x="120000" y="0"/>
+                </a:lnTo>
+                <a:lnTo>
+                  <a:pt x="120000" y="120000"/>
+                </a:lnTo>
+                <a:lnTo>
+                  <a:pt x="0" y="120000"/>
+                </a:lnTo>
+                <a:close/>
+              </a:path>
+            </a:pathLst>
+          </a:custGeom>
+        </p:spPr>
+      </p:sp>
+    </p:spTree>
+    <p:extLst>
+      <p:ext uri="{BB962C8B-B14F-4D97-AF65-F5344CB8AC3E}">
+        <p14:creationId xmlns:p14="http://schemas.microsoft.com/office/powerpoint/2010/main" val="2020544240"/>
+      </p:ext>
+    </p:extLst>
   </p:cSld>
   <p:clrMapOvr>
     <a:masterClrMapping/>
@@ -26537,6 +27072,1386 @@
           <p:cNvPr id="2" name="Title 1">
             <a:extLst>
               <a:ext uri="{FF2B5EF4-FFF2-40B4-BE49-F238E27FC236}">
+                <a16:creationId xmlns:a16="http://schemas.microsoft.com/office/drawing/2014/main" id="{CB270EC6-F6C1-4C24-95AD-8FF1F21693FE}"/>
+              </a:ext>
+            </a:extLst>
+          </p:cNvPr>
+          <p:cNvSpPr>
+            <a:spLocks noGrp="1"/>
+          </p:cNvSpPr>
+          <p:nvPr>
+            <p:ph type="title"/>
+          </p:nvPr>
+        </p:nvSpPr>
+        <p:spPr/>
+        <p:txBody>
+          <a:bodyPr/>
+          <a:lstStyle/>
+          <a:p>
+            <a:r>
+              <a:rPr lang="en-US" dirty="0"/>
+              <a:t>Overloading</a:t>
+            </a:r>
+          </a:p>
+        </p:txBody>
+      </p:sp>
+      <p:sp>
+        <p:nvSpPr>
+          <p:cNvPr id="3" name="Text Placeholder 2">
+            <a:extLst>
+              <a:ext uri="{FF2B5EF4-FFF2-40B4-BE49-F238E27FC236}">
+                <a16:creationId xmlns:a16="http://schemas.microsoft.com/office/drawing/2014/main" id="{F7CFAE28-6DEE-4061-B15A-C0B69A35AB6A}"/>
+              </a:ext>
+            </a:extLst>
+          </p:cNvPr>
+          <p:cNvSpPr>
+            <a:spLocks noGrp="1"/>
+          </p:cNvSpPr>
+          <p:nvPr>
+            <p:ph type="body" idx="1"/>
+          </p:nvPr>
+        </p:nvSpPr>
+        <p:spPr/>
+        <p:txBody>
+          <a:bodyPr/>
+          <a:lstStyle/>
+          <a:p>
+            <a:r>
+              <a:rPr lang="en-US" dirty="0"/>
+              <a:t>Two methods in the same class with the </a:t>
+            </a:r>
+            <a:r>
+              <a:rPr lang="en-US" i="1" dirty="0"/>
+              <a:t>same name </a:t>
+            </a:r>
+            <a:r>
+              <a:rPr lang="en-US" dirty="0"/>
+              <a:t>but different parameter lists. </a:t>
+            </a:r>
+          </a:p>
+          <a:p>
+            <a:endParaRPr lang="en-US" dirty="0"/>
+          </a:p>
+          <a:p>
+            <a:endParaRPr lang="en-US" dirty="0"/>
+          </a:p>
+          <a:p>
+            <a:endParaRPr lang="en-US" dirty="0"/>
+          </a:p>
+          <a:p>
+            <a:endParaRPr lang="en-US" dirty="0"/>
+          </a:p>
+          <a:p>
+            <a:endParaRPr lang="en-US" dirty="0"/>
+          </a:p>
+          <a:p>
+            <a:endParaRPr lang="en-US" dirty="0"/>
+          </a:p>
+          <a:p>
+            <a:r>
+              <a:rPr lang="en-US" dirty="0"/>
+              <a:t>Can be performed with methods and constructors</a:t>
+            </a:r>
+          </a:p>
+          <a:p>
+            <a:pPr marL="50800" indent="0">
+              <a:buNone/>
+            </a:pPr>
+            <a:endParaRPr lang="en-US" dirty="0"/>
+          </a:p>
+        </p:txBody>
+      </p:sp>
+      <p:sp>
+        <p:nvSpPr>
+          <p:cNvPr id="4" name="Slide Number Placeholder 3">
+            <a:extLst>
+              <a:ext uri="{FF2B5EF4-FFF2-40B4-BE49-F238E27FC236}">
+                <a16:creationId xmlns:a16="http://schemas.microsoft.com/office/drawing/2014/main" id="{5FA3B802-FFC7-497A-92B9-C59E8ABB0694}"/>
+              </a:ext>
+            </a:extLst>
+          </p:cNvPr>
+          <p:cNvSpPr>
+            <a:spLocks noGrp="1"/>
+          </p:cNvSpPr>
+          <p:nvPr>
+            <p:ph type="sldNum" idx="12"/>
+          </p:nvPr>
+        </p:nvSpPr>
+        <p:spPr/>
+        <p:txBody>
+          <a:bodyPr/>
+          <a:lstStyle/>
+          <a:p>
+            <a:pPr marL="0" lvl="0" indent="0" algn="r" rtl="0">
+              <a:spcBef>
+                <a:spcPts val="0"/>
+              </a:spcBef>
+              <a:spcAft>
+                <a:spcPts val="0"/>
+              </a:spcAft>
+              <a:buNone/>
+            </a:pPr>
+            <a:fld id="{00000000-1234-1234-1234-123412341234}" type="slidenum">
+              <a:rPr lang="en-US" smtClean="0"/>
+              <a:t>9</a:t>
+            </a:fld>
+            <a:endParaRPr lang="en-US"/>
+          </a:p>
+        </p:txBody>
+      </p:sp>
+      <p:sp>
+        <p:nvSpPr>
+          <p:cNvPr id="5" name="Rectangle 4">
+            <a:extLst>
+              <a:ext uri="{FF2B5EF4-FFF2-40B4-BE49-F238E27FC236}">
+                <a16:creationId xmlns:a16="http://schemas.microsoft.com/office/drawing/2014/main" id="{F764A644-973F-46ED-82C1-53087C91377A}"/>
+              </a:ext>
+            </a:extLst>
+          </p:cNvPr>
+          <p:cNvSpPr/>
+          <p:nvPr/>
+        </p:nvSpPr>
+        <p:spPr>
+          <a:xfrm>
+            <a:off x="971421" y="2702257"/>
+            <a:ext cx="6412018" cy="2561166"/>
+          </a:xfrm>
+          <a:prstGeom prst="rect">
+            <a:avLst/>
+          </a:prstGeom>
+        </p:spPr>
+        <p:style>
+          <a:lnRef idx="1">
+            <a:schemeClr val="accent2"/>
+          </a:lnRef>
+          <a:fillRef idx="2">
+            <a:schemeClr val="accent2"/>
+          </a:fillRef>
+          <a:effectRef idx="1">
+            <a:schemeClr val="accent2"/>
+          </a:effectRef>
+          <a:fontRef idx="minor">
+            <a:schemeClr val="dk1"/>
+          </a:fontRef>
+        </p:style>
+        <p:txBody>
+          <a:bodyPr rtlCol="0" anchor="ctr"/>
+          <a:lstStyle/>
+          <a:p>
+            <a:pPr lvl="0">
+              <a:lnSpc>
+                <a:spcPct val="80000"/>
+              </a:lnSpc>
+              <a:buSzPts val="1750"/>
+            </a:pPr>
+            <a:r>
+              <a:rPr lang="en-US" dirty="0">
+                <a:latin typeface="Courier New"/>
+                <a:ea typeface="Courier New"/>
+                <a:cs typeface="Courier New"/>
+                <a:sym typeface="Courier New"/>
+              </a:rPr>
+              <a:t>public class Animal {</a:t>
+            </a:r>
+          </a:p>
+          <a:p>
+            <a:pPr lvl="0">
+              <a:lnSpc>
+                <a:spcPct val="80000"/>
+              </a:lnSpc>
+              <a:buSzPts val="1750"/>
+            </a:pPr>
+            <a:r>
+              <a:rPr lang="en-US" dirty="0">
+                <a:latin typeface="Courier New"/>
+                <a:ea typeface="Courier New"/>
+                <a:cs typeface="Courier New"/>
+                <a:sym typeface="Courier New"/>
+              </a:rPr>
+              <a:t>	public void </a:t>
+            </a:r>
+            <a:r>
+              <a:rPr lang="en-US" dirty="0" err="1">
+                <a:latin typeface="Courier New"/>
+                <a:ea typeface="Courier New"/>
+                <a:cs typeface="Courier New"/>
+                <a:sym typeface="Courier New"/>
+              </a:rPr>
+              <a:t>printInfo</a:t>
+            </a:r>
+            <a:r>
+              <a:rPr lang="en-US" dirty="0">
+                <a:latin typeface="Courier New"/>
+                <a:ea typeface="Courier New"/>
+                <a:cs typeface="Courier New"/>
+                <a:sym typeface="Courier New"/>
+              </a:rPr>
+              <a:t>(){</a:t>
+            </a:r>
+            <a:br>
+              <a:rPr lang="en-US" dirty="0">
+                <a:latin typeface="Courier New"/>
+                <a:ea typeface="Courier New"/>
+                <a:cs typeface="Courier New"/>
+                <a:sym typeface="Courier New"/>
+              </a:rPr>
+            </a:br>
+            <a:r>
+              <a:rPr lang="en-US" dirty="0">
+                <a:latin typeface="Courier New"/>
+                <a:ea typeface="Courier New"/>
+                <a:cs typeface="Courier New"/>
+                <a:sym typeface="Courier New"/>
+              </a:rPr>
+              <a:t>		</a:t>
+            </a:r>
+            <a:r>
+              <a:rPr lang="en-US" dirty="0" err="1">
+                <a:latin typeface="Courier New"/>
+                <a:ea typeface="Courier New"/>
+                <a:cs typeface="Courier New"/>
+                <a:sym typeface="Courier New"/>
+              </a:rPr>
+              <a:t>System.out.println</a:t>
+            </a:r>
+            <a:r>
+              <a:rPr lang="en-US" dirty="0">
+                <a:latin typeface="Courier New"/>
+                <a:ea typeface="Courier New"/>
+                <a:cs typeface="Courier New"/>
+                <a:sym typeface="Courier New"/>
+              </a:rPr>
+              <a:t>(“Print info”);</a:t>
+            </a:r>
+            <a:br>
+              <a:rPr lang="en-US" dirty="0">
+                <a:latin typeface="Courier New"/>
+                <a:ea typeface="Courier New"/>
+                <a:cs typeface="Courier New"/>
+                <a:sym typeface="Courier New"/>
+              </a:rPr>
+            </a:br>
+            <a:r>
+              <a:rPr lang="en-US" dirty="0">
+                <a:latin typeface="Courier New"/>
+                <a:ea typeface="Courier New"/>
+                <a:cs typeface="Courier New"/>
+                <a:sym typeface="Courier New"/>
+              </a:rPr>
+              <a:t>	}</a:t>
+            </a:r>
+          </a:p>
+          <a:p>
+            <a:pPr lvl="0">
+              <a:lnSpc>
+                <a:spcPct val="80000"/>
+              </a:lnSpc>
+              <a:buSzPts val="1750"/>
+            </a:pPr>
+            <a:r>
+              <a:rPr lang="en-US" dirty="0">
+                <a:latin typeface="Courier New"/>
+                <a:ea typeface="Courier New"/>
+                <a:cs typeface="Courier New"/>
+                <a:sym typeface="Courier New"/>
+              </a:rPr>
+              <a:t>	</a:t>
+            </a:r>
+          </a:p>
+          <a:p>
+            <a:pPr lvl="0">
+              <a:lnSpc>
+                <a:spcPct val="80000"/>
+              </a:lnSpc>
+              <a:buSzPts val="1750"/>
+            </a:pPr>
+            <a:r>
+              <a:rPr lang="en-US" dirty="0">
+                <a:latin typeface="Courier New"/>
+                <a:ea typeface="Courier New"/>
+                <a:cs typeface="Courier New"/>
+                <a:sym typeface="Courier New"/>
+              </a:rPr>
+              <a:t>	public void </a:t>
+            </a:r>
+            <a:r>
+              <a:rPr lang="en-US" dirty="0" err="1">
+                <a:latin typeface="Courier New"/>
+                <a:ea typeface="Courier New"/>
+                <a:cs typeface="Courier New"/>
+                <a:sym typeface="Courier New"/>
+              </a:rPr>
+              <a:t>printInfo</a:t>
+            </a:r>
+            <a:r>
+              <a:rPr lang="en-US" dirty="0">
+                <a:latin typeface="Courier New"/>
+                <a:ea typeface="Courier New"/>
+                <a:cs typeface="Courier New"/>
+                <a:sym typeface="Courier New"/>
+              </a:rPr>
+              <a:t>(</a:t>
+            </a:r>
+            <a:r>
+              <a:rPr lang="en-US" b="1" dirty="0">
+                <a:latin typeface="Courier New"/>
+                <a:ea typeface="Courier New"/>
+                <a:cs typeface="Courier New"/>
+                <a:sym typeface="Courier New"/>
+              </a:rPr>
+              <a:t>String s</a:t>
+            </a:r>
+            <a:r>
+              <a:rPr lang="en-US" dirty="0">
+                <a:latin typeface="Courier New"/>
+                <a:ea typeface="Courier New"/>
+                <a:cs typeface="Courier New"/>
+                <a:sym typeface="Courier New"/>
+              </a:rPr>
+              <a:t>){</a:t>
+            </a:r>
+            <a:br>
+              <a:rPr lang="en-US" dirty="0">
+                <a:latin typeface="Courier New"/>
+                <a:ea typeface="Courier New"/>
+                <a:cs typeface="Courier New"/>
+                <a:sym typeface="Courier New"/>
+              </a:rPr>
+            </a:br>
+            <a:r>
+              <a:rPr lang="en-US" dirty="0">
+                <a:latin typeface="Courier New"/>
+                <a:ea typeface="Courier New"/>
+                <a:cs typeface="Courier New"/>
+                <a:sym typeface="Courier New"/>
+              </a:rPr>
+              <a:t>		 </a:t>
+            </a:r>
+            <a:r>
+              <a:rPr lang="en-US" dirty="0" err="1">
+                <a:latin typeface="Courier New"/>
+                <a:ea typeface="Courier New"/>
+                <a:cs typeface="Courier New"/>
+                <a:sym typeface="Courier New"/>
+              </a:rPr>
+              <a:t>System.out.println</a:t>
+            </a:r>
+            <a:r>
+              <a:rPr lang="en-US" dirty="0">
+                <a:latin typeface="Courier New"/>
+                <a:ea typeface="Courier New"/>
+                <a:cs typeface="Courier New"/>
+                <a:sym typeface="Courier New"/>
+              </a:rPr>
+              <a:t>(“Print info: ”+s);</a:t>
+            </a:r>
+            <a:br>
+              <a:rPr lang="en-US" dirty="0">
+                <a:latin typeface="Courier New"/>
+                <a:ea typeface="Courier New"/>
+                <a:cs typeface="Courier New"/>
+                <a:sym typeface="Courier New"/>
+              </a:rPr>
+            </a:br>
+            <a:r>
+              <a:rPr lang="en-US" dirty="0">
+                <a:latin typeface="Courier New"/>
+                <a:ea typeface="Courier New"/>
+                <a:cs typeface="Courier New"/>
+                <a:sym typeface="Courier New"/>
+              </a:rPr>
+              <a:t>	}</a:t>
+            </a:r>
+          </a:p>
+          <a:p>
+            <a:pPr lvl="0">
+              <a:lnSpc>
+                <a:spcPct val="80000"/>
+              </a:lnSpc>
+              <a:buSzPts val="1750"/>
+            </a:pPr>
+            <a:r>
+              <a:rPr lang="en-US" dirty="0">
+                <a:latin typeface="Courier New"/>
+                <a:ea typeface="Courier New"/>
+                <a:cs typeface="Courier New"/>
+                <a:sym typeface="Courier New"/>
+              </a:rPr>
+              <a:t>}</a:t>
+            </a:r>
+            <a:endParaRPr lang="en-US" dirty="0"/>
+          </a:p>
+          <a:p>
+            <a:pPr lvl="0">
+              <a:lnSpc>
+                <a:spcPct val="80000"/>
+              </a:lnSpc>
+              <a:spcBef>
+                <a:spcPts val="350"/>
+              </a:spcBef>
+              <a:buSzPts val="1750"/>
+            </a:pPr>
+            <a:endParaRPr lang="en-US" dirty="0">
+              <a:latin typeface="Courier New"/>
+              <a:ea typeface="Courier New"/>
+              <a:cs typeface="Courier New"/>
+              <a:sym typeface="Courier New"/>
+            </a:endParaRPr>
+          </a:p>
+          <a:p>
+            <a:pPr algn="ctr"/>
+            <a:endParaRPr lang="en-US" dirty="0"/>
+          </a:p>
+        </p:txBody>
+      </p:sp>
+    </p:spTree>
+    <p:extLst>
+      <p:ext uri="{BB962C8B-B14F-4D97-AF65-F5344CB8AC3E}">
+        <p14:creationId xmlns:p14="http://schemas.microsoft.com/office/powerpoint/2010/main" val="2975078769"/>
+      </p:ext>
+    </p:extLst>
+  </p:cSld>
+  <p:clrMapOvr>
+    <a:masterClrMapping/>
+  </p:clrMapOvr>
+  <p:timing>
+    <p:tnLst>
+      <p:par>
+        <p:cTn id="1" dur="indefinite" restart="never" nodeType="tmRoot">
+          <p:childTnLst>
+            <p:seq concurrent="1" nextAc="seek">
+              <p:cTn id="2" dur="indefinite" nodeType="mainSeq">
+                <p:childTnLst>
+                  <p:par>
+                    <p:cTn id="3" fill="hold">
+                      <p:stCondLst>
+                        <p:cond delay="indefinite"/>
+                      </p:stCondLst>
+                      <p:childTnLst>
+                        <p:par>
+                          <p:cTn id="4" fill="hold">
+                            <p:stCondLst>
+                              <p:cond delay="0"/>
+                            </p:stCondLst>
+                            <p:childTnLst>
+                              <p:par>
+                                <p:cTn id="5" presetID="1" presetClass="entr" presetSubtype="0" fill="hold" grpId="0" nodeType="clickEffect">
+                                  <p:stCondLst>
+                                    <p:cond delay="0"/>
+                                  </p:stCondLst>
+                                  <p:childTnLst>
+                                    <p:set>
+                                      <p:cBhvr>
+                                        <p:cTn id="6" dur="1" fill="hold">
+                                          <p:stCondLst>
+                                            <p:cond delay="0"/>
+                                          </p:stCondLst>
+                                        </p:cTn>
+                                        <p:tgtEl>
+                                          <p:spTgt spid="5"/>
+                                        </p:tgtEl>
+                                        <p:attrNameLst>
+                                          <p:attrName>style.visibility</p:attrName>
+                                        </p:attrNameLst>
+                                      </p:cBhvr>
+                                      <p:to>
+                                        <p:strVal val="visible"/>
+                                      </p:to>
+                                    </p:set>
+                                  </p:childTnLst>
+                                </p:cTn>
+                              </p:par>
+                            </p:childTnLst>
+                          </p:cTn>
+                        </p:par>
+                      </p:childTnLst>
+                    </p:cTn>
+                  </p:par>
+                </p:childTnLst>
+              </p:cTn>
+              <p:prevCondLst>
+                <p:cond evt="onPrev" delay="0">
+                  <p:tgtEl>
+                    <p:sldTgt/>
+                  </p:tgtEl>
+                </p:cond>
+              </p:prevCondLst>
+              <p:nextCondLst>
+                <p:cond evt="onNext" delay="0">
+                  <p:tgtEl>
+                    <p:sldTgt/>
+                  </p:tgtEl>
+                </p:cond>
+              </p:nextCondLst>
+            </p:seq>
+          </p:childTnLst>
+        </p:cTn>
+      </p:par>
+    </p:tnLst>
+    <p:bldLst>
+      <p:bldP spid="5" grpId="0" animBg="1"/>
+    </p:bldLst>
+  </p:timing>
+</p:sld>
+</file>
+
+<file path=ppt/slides/slide11.xml><?xml version="1.0" encoding="utf-8"?>
+<p:sld xmlns:a="http://schemas.openxmlformats.org/drawingml/2006/main" xmlns:r="http://schemas.openxmlformats.org/officeDocument/2006/relationships" xmlns:p="http://schemas.openxmlformats.org/presentationml/2006/main">
+  <p:cSld>
+    <p:spTree>
+      <p:nvGrpSpPr>
+        <p:cNvPr id="1" name="Shape 231"/>
+        <p:cNvGrpSpPr/>
+        <p:nvPr/>
+      </p:nvGrpSpPr>
+      <p:grpSpPr>
+        <a:xfrm>
+          <a:off x="0" y="0"/>
+          <a:ext cx="0" cy="0"/>
+          <a:chOff x="0" y="0"/>
+          <a:chExt cx="0" cy="0"/>
+        </a:xfrm>
+      </p:grpSpPr>
+      <p:sp>
+        <p:nvSpPr>
+          <p:cNvPr id="232" name="Google Shape;232;p18"/>
+          <p:cNvSpPr txBox="1">
+            <a:spLocks noGrp="1"/>
+          </p:cNvSpPr>
+          <p:nvPr>
+            <p:ph type="title"/>
+          </p:nvPr>
+        </p:nvSpPr>
+        <p:spPr>
+          <a:xfrm>
+            <a:off x="380010" y="-4950"/>
+            <a:ext cx="6222671" cy="1224150"/>
+          </a:xfrm>
+          <a:prstGeom prst="rect">
+            <a:avLst/>
+          </a:prstGeom>
+          <a:noFill/>
+          <a:ln>
+            <a:noFill/>
+          </a:ln>
+        </p:spPr>
+        <p:txBody>
+          <a:bodyPr spcFirstLastPara="1" wrap="square" lIns="91425" tIns="45700" rIns="91425" bIns="45700" anchor="ctr" anchorCtr="0">
+            <a:noAutofit/>
+          </a:bodyPr>
+          <a:lstStyle/>
+          <a:p>
+            <a:pPr marL="0" lvl="0" indent="0" algn="l" rtl="0">
+              <a:spcBef>
+                <a:spcPts val="0"/>
+              </a:spcBef>
+              <a:spcAft>
+                <a:spcPts val="0"/>
+              </a:spcAft>
+              <a:buClr>
+                <a:schemeClr val="lt1"/>
+              </a:buClr>
+              <a:buSzPts val="2400"/>
+              <a:buFont typeface="Arial"/>
+              <a:buNone/>
+            </a:pPr>
+            <a:r>
+              <a:rPr lang="en-US" dirty="0"/>
+              <a:t>Common Use</a:t>
+            </a:r>
+            <a:endParaRPr dirty="0"/>
+          </a:p>
+        </p:txBody>
+      </p:sp>
+      <p:sp>
+        <p:nvSpPr>
+          <p:cNvPr id="233" name="Google Shape;233;p18"/>
+          <p:cNvSpPr txBox="1">
+            <a:spLocks noGrp="1"/>
+          </p:cNvSpPr>
+          <p:nvPr>
+            <p:ph type="body" idx="1"/>
+          </p:nvPr>
+        </p:nvSpPr>
+        <p:spPr>
+          <a:xfrm>
+            <a:off x="380010" y="1481446"/>
+            <a:ext cx="8383980" cy="4525963"/>
+          </a:xfrm>
+          <a:prstGeom prst="rect">
+            <a:avLst/>
+          </a:prstGeom>
+          <a:noFill/>
+          <a:ln>
+            <a:noFill/>
+          </a:ln>
+        </p:spPr>
+        <p:txBody>
+          <a:bodyPr spcFirstLastPara="1" wrap="square" lIns="91425" tIns="45700" rIns="91425" bIns="45700" anchor="t" anchorCtr="0">
+            <a:noAutofit/>
+          </a:bodyPr>
+          <a:lstStyle/>
+          <a:p>
+            <a:pPr marL="342900" lvl="0" indent="-342900" algn="l" rtl="0">
+              <a:spcBef>
+                <a:spcPts val="0"/>
+              </a:spcBef>
+              <a:spcAft>
+                <a:spcPts val="0"/>
+              </a:spcAft>
+              <a:buSzPts val="2800"/>
+              <a:buChar char="•"/>
+            </a:pPr>
+            <a:r>
+              <a:rPr lang="en-US" sz="2400" dirty="0"/>
+              <a:t>Constructor Overloading:</a:t>
+            </a:r>
+          </a:p>
+          <a:p>
+            <a:pPr marL="342900" lvl="0" indent="-342900" algn="l" rtl="0">
+              <a:spcBef>
+                <a:spcPts val="0"/>
+              </a:spcBef>
+              <a:spcAft>
+                <a:spcPts val="0"/>
+              </a:spcAft>
+              <a:buSzPts val="2800"/>
+              <a:buChar char="•"/>
+            </a:pPr>
+            <a:endParaRPr lang="en-US" sz="2400" dirty="0"/>
+          </a:p>
+          <a:p>
+            <a:pPr marL="0" lvl="0" indent="0" algn="l" rtl="0">
+              <a:spcBef>
+                <a:spcPts val="0"/>
+              </a:spcBef>
+              <a:spcAft>
+                <a:spcPts val="0"/>
+              </a:spcAft>
+              <a:buSzPts val="2800"/>
+              <a:buNone/>
+            </a:pPr>
+            <a:endParaRPr lang="en-US" sz="1600" dirty="0"/>
+          </a:p>
+        </p:txBody>
+      </p:sp>
+      <p:sp>
+        <p:nvSpPr>
+          <p:cNvPr id="234" name="Google Shape;234;p18"/>
+          <p:cNvSpPr txBox="1">
+            <a:spLocks noGrp="1"/>
+          </p:cNvSpPr>
+          <p:nvPr>
+            <p:ph type="sldNum" idx="12"/>
+          </p:nvPr>
+        </p:nvSpPr>
+        <p:spPr>
+          <a:xfrm>
+            <a:off x="8122757" y="6363712"/>
+            <a:ext cx="861671" cy="365125"/>
+          </a:xfrm>
+          <a:prstGeom prst="rect">
+            <a:avLst/>
+          </a:prstGeom>
+          <a:noFill/>
+          <a:ln>
+            <a:noFill/>
+          </a:ln>
+        </p:spPr>
+        <p:txBody>
+          <a:bodyPr spcFirstLastPara="1" wrap="square" lIns="91425" tIns="45700" rIns="91425" bIns="45700" anchor="ctr" anchorCtr="0">
+            <a:noAutofit/>
+          </a:bodyPr>
+          <a:lstStyle/>
+          <a:p>
+            <a:pPr marL="0" lvl="0" indent="0" algn="r" rtl="0">
+              <a:spcBef>
+                <a:spcPts val="0"/>
+              </a:spcBef>
+              <a:spcAft>
+                <a:spcPts val="0"/>
+              </a:spcAft>
+              <a:buNone/>
+            </a:pPr>
+            <a:fld id="{00000000-1234-1234-1234-123412341234}" type="slidenum">
+              <a:rPr lang="en-US"/>
+              <a:t>10</a:t>
+            </a:fld>
+            <a:endParaRPr/>
+          </a:p>
+        </p:txBody>
+      </p:sp>
+      <p:sp>
+        <p:nvSpPr>
+          <p:cNvPr id="7" name="Google Shape;226;p17">
+            <a:extLst>
+              <a:ext uri="{FF2B5EF4-FFF2-40B4-BE49-F238E27FC236}">
+                <a16:creationId xmlns:a16="http://schemas.microsoft.com/office/drawing/2014/main" id="{A1C37EF7-5FE2-4D44-AD59-D5E2CDB966EC}"/>
+              </a:ext>
+            </a:extLst>
+          </p:cNvPr>
+          <p:cNvSpPr txBox="1">
+            <a:spLocks/>
+          </p:cNvSpPr>
+          <p:nvPr/>
+        </p:nvSpPr>
+        <p:spPr>
+          <a:xfrm>
+            <a:off x="380010" y="2134620"/>
+            <a:ext cx="8383980" cy="4135035"/>
+          </a:xfrm>
+          <a:prstGeom prst="rect">
+            <a:avLst/>
+          </a:prstGeom>
+        </p:spPr>
+        <p:style>
+          <a:lnRef idx="1">
+            <a:schemeClr val="accent2"/>
+          </a:lnRef>
+          <a:fillRef idx="2">
+            <a:schemeClr val="accent2"/>
+          </a:fillRef>
+          <a:effectRef idx="1">
+            <a:schemeClr val="accent2"/>
+          </a:effectRef>
+          <a:fontRef idx="minor">
+            <a:schemeClr val="dk1"/>
+          </a:fontRef>
+        </p:style>
+        <p:txBody>
+          <a:bodyPr spcFirstLastPara="1" vert="horz" wrap="square" lIns="91425" tIns="45700" rIns="91425" bIns="45700" rtlCol="0" anchor="t" anchorCtr="0">
+            <a:normAutofit/>
+          </a:bodyPr>
+          <a:lstStyle>
+            <a:lvl1pPr marL="342900" indent="-342900" algn="l" defTabSz="914400" rtl="0" eaLnBrk="1" latinLnBrk="0" hangingPunct="1">
+              <a:spcBef>
+                <a:spcPct val="20000"/>
+              </a:spcBef>
+              <a:buClr>
+                <a:schemeClr val="accent1"/>
+              </a:buClr>
+              <a:buFont typeface="Arial" panose="020B0604020202020204" pitchFamily="34" charset="0"/>
+              <a:buChar char="•"/>
+              <a:defRPr sz="2800" kern="1200" baseline="0">
+                <a:solidFill>
+                  <a:schemeClr val="dk1"/>
+                </a:solidFill>
+                <a:latin typeface="Arial" panose="020B0604020202020204" pitchFamily="34" charset="0"/>
+                <a:ea typeface="+mn-ea"/>
+                <a:cs typeface="Arial" panose="020B0604020202020204" pitchFamily="34" charset="0"/>
+              </a:defRPr>
+            </a:lvl1pPr>
+            <a:lvl2pPr marL="742950" indent="-285750" algn="l" defTabSz="914400" rtl="0" eaLnBrk="1" latinLnBrk="0" hangingPunct="1">
+              <a:spcBef>
+                <a:spcPct val="20000"/>
+              </a:spcBef>
+              <a:buClr>
+                <a:schemeClr val="accent1"/>
+              </a:buClr>
+              <a:buFont typeface="Arial" panose="020B0604020202020204" pitchFamily="34" charset="0"/>
+              <a:buChar char="–"/>
+              <a:defRPr sz="2400" kern="1200" baseline="0">
+                <a:solidFill>
+                  <a:schemeClr val="dk1"/>
+                </a:solidFill>
+                <a:latin typeface="Arial" panose="020B0604020202020204" pitchFamily="34" charset="0"/>
+                <a:ea typeface="+mn-ea"/>
+                <a:cs typeface="Arial" panose="020B0604020202020204" pitchFamily="34" charset="0"/>
+              </a:defRPr>
+            </a:lvl2pPr>
+            <a:lvl3pPr marL="1143000" indent="-228600" algn="l" defTabSz="914400" rtl="0" eaLnBrk="1" latinLnBrk="0" hangingPunct="1">
+              <a:spcBef>
+                <a:spcPct val="20000"/>
+              </a:spcBef>
+              <a:buClr>
+                <a:schemeClr val="accent1"/>
+              </a:buClr>
+              <a:buFont typeface="Arial" panose="020B0604020202020204" pitchFamily="34" charset="0"/>
+              <a:buChar char="•"/>
+              <a:defRPr sz="2000" kern="1200" baseline="0">
+                <a:solidFill>
+                  <a:schemeClr val="dk1"/>
+                </a:solidFill>
+                <a:latin typeface="Arial" panose="020B0604020202020204" pitchFamily="34" charset="0"/>
+                <a:ea typeface="+mn-ea"/>
+                <a:cs typeface="Arial" panose="020B0604020202020204" pitchFamily="34" charset="0"/>
+              </a:defRPr>
+            </a:lvl3pPr>
+            <a:lvl4pPr marL="1600200" indent="-228600" algn="l" defTabSz="914400" rtl="0" eaLnBrk="1" latinLnBrk="0" hangingPunct="1">
+              <a:spcBef>
+                <a:spcPct val="20000"/>
+              </a:spcBef>
+              <a:buClr>
+                <a:schemeClr val="accent1"/>
+              </a:buClr>
+              <a:buFont typeface="Arial" panose="020B0604020202020204" pitchFamily="34" charset="0"/>
+              <a:buChar char="–"/>
+              <a:defRPr sz="1800" kern="1200" baseline="0">
+                <a:solidFill>
+                  <a:schemeClr val="dk1"/>
+                </a:solidFill>
+                <a:latin typeface="Arial" panose="020B0604020202020204" pitchFamily="34" charset="0"/>
+                <a:ea typeface="+mn-ea"/>
+                <a:cs typeface="Arial" panose="020B0604020202020204" pitchFamily="34" charset="0"/>
+              </a:defRPr>
+            </a:lvl4pPr>
+            <a:lvl5pPr marL="2057400" indent="-228600" algn="l" defTabSz="914400" rtl="0" eaLnBrk="1" latinLnBrk="0" hangingPunct="1">
+              <a:spcBef>
+                <a:spcPct val="20000"/>
+              </a:spcBef>
+              <a:buClr>
+                <a:schemeClr val="accent1"/>
+              </a:buClr>
+              <a:buFont typeface="Arial" panose="020B0604020202020204" pitchFamily="34" charset="0"/>
+              <a:buChar char="»"/>
+              <a:defRPr sz="1800" kern="1200" baseline="0">
+                <a:solidFill>
+                  <a:schemeClr val="dk1"/>
+                </a:solidFill>
+                <a:latin typeface="Arial" panose="020B0604020202020204" pitchFamily="34" charset="0"/>
+                <a:ea typeface="+mn-ea"/>
+                <a:cs typeface="Arial" panose="020B0604020202020204" pitchFamily="34" charset="0"/>
+              </a:defRPr>
+            </a:lvl5pPr>
+            <a:lvl6pPr marL="2514600" indent="-228600" algn="l" defTabSz="914400" rtl="0" eaLnBrk="1" latinLnBrk="0" hangingPunct="1">
+              <a:spcBef>
+                <a:spcPct val="20000"/>
+              </a:spcBef>
+              <a:buFont typeface="Arial" panose="020B0604020202020204" pitchFamily="34" charset="0"/>
+              <a:buChar char="•"/>
+              <a:defRPr sz="2000" kern="1200">
+                <a:solidFill>
+                  <a:schemeClr val="dk1"/>
+                </a:solidFill>
+                <a:latin typeface="+mn-lt"/>
+                <a:ea typeface="+mn-ea"/>
+                <a:cs typeface="+mn-cs"/>
+              </a:defRPr>
+            </a:lvl6pPr>
+            <a:lvl7pPr marL="2971800" indent="-228600" algn="l" defTabSz="914400" rtl="0" eaLnBrk="1" latinLnBrk="0" hangingPunct="1">
+              <a:spcBef>
+                <a:spcPct val="20000"/>
+              </a:spcBef>
+              <a:buFont typeface="Arial" panose="020B0604020202020204" pitchFamily="34" charset="0"/>
+              <a:buChar char="•"/>
+              <a:defRPr sz="2000" kern="1200">
+                <a:solidFill>
+                  <a:schemeClr val="dk1"/>
+                </a:solidFill>
+                <a:latin typeface="+mn-lt"/>
+                <a:ea typeface="+mn-ea"/>
+                <a:cs typeface="+mn-cs"/>
+              </a:defRPr>
+            </a:lvl7pPr>
+            <a:lvl8pPr marL="3429000" indent="-228600" algn="l" defTabSz="914400" rtl="0" eaLnBrk="1" latinLnBrk="0" hangingPunct="1">
+              <a:spcBef>
+                <a:spcPct val="20000"/>
+              </a:spcBef>
+              <a:buFont typeface="Arial" panose="020B0604020202020204" pitchFamily="34" charset="0"/>
+              <a:buChar char="•"/>
+              <a:defRPr sz="2000" kern="1200">
+                <a:solidFill>
+                  <a:schemeClr val="dk1"/>
+                </a:solidFill>
+                <a:latin typeface="+mn-lt"/>
+                <a:ea typeface="+mn-ea"/>
+                <a:cs typeface="+mn-cs"/>
+              </a:defRPr>
+            </a:lvl8pPr>
+            <a:lvl9pPr marL="3886200" indent="-228600" algn="l" defTabSz="914400" rtl="0" eaLnBrk="1" latinLnBrk="0" hangingPunct="1">
+              <a:spcBef>
+                <a:spcPct val="20000"/>
+              </a:spcBef>
+              <a:buFont typeface="Arial" panose="020B0604020202020204" pitchFamily="34" charset="0"/>
+              <a:buChar char="•"/>
+              <a:defRPr sz="2000" kern="1200">
+                <a:solidFill>
+                  <a:schemeClr val="dk1"/>
+                </a:solidFill>
+                <a:latin typeface="+mn-lt"/>
+                <a:ea typeface="+mn-ea"/>
+                <a:cs typeface="+mn-cs"/>
+              </a:defRPr>
+            </a:lvl9pPr>
+          </a:lstStyle>
+          <a:p>
+            <a:pPr marL="0" lvl="0" indent="0" algn="l" rtl="0">
+              <a:spcBef>
+                <a:spcPts val="0"/>
+              </a:spcBef>
+              <a:spcAft>
+                <a:spcPts val="0"/>
+              </a:spcAft>
+              <a:buSzPts val="2800"/>
+              <a:buNone/>
+            </a:pPr>
+            <a:r>
+              <a:rPr lang="en-US" sz="1800" b="1" dirty="0">
+                <a:latin typeface="Courier New" panose="02070309020205020404" pitchFamily="49" charset="0"/>
+                <a:cs typeface="Courier New" panose="02070309020205020404" pitchFamily="49" charset="0"/>
+              </a:rPr>
+              <a:t>public class</a:t>
+            </a:r>
+            <a:r>
+              <a:rPr lang="en-US" sz="1800" dirty="0">
+                <a:latin typeface="Courier New" panose="02070309020205020404" pitchFamily="49" charset="0"/>
+                <a:cs typeface="Courier New" panose="02070309020205020404" pitchFamily="49" charset="0"/>
+              </a:rPr>
+              <a:t> Creature {</a:t>
+            </a:r>
+          </a:p>
+          <a:p>
+            <a:pPr marL="0" lvl="0" indent="0" algn="l" rtl="0">
+              <a:spcBef>
+                <a:spcPts val="0"/>
+              </a:spcBef>
+              <a:spcAft>
+                <a:spcPts val="0"/>
+              </a:spcAft>
+              <a:buSzPts val="2800"/>
+              <a:buNone/>
+            </a:pPr>
+            <a:r>
+              <a:rPr lang="en-US" sz="1800" dirty="0">
+                <a:latin typeface="Courier New" panose="02070309020205020404" pitchFamily="49" charset="0"/>
+                <a:cs typeface="Courier New" panose="02070309020205020404" pitchFamily="49" charset="0"/>
+              </a:rPr>
+              <a:t>     </a:t>
+            </a:r>
+            <a:r>
+              <a:rPr lang="en-US" sz="1800" b="1" dirty="0">
+                <a:latin typeface="Courier New" panose="02070309020205020404" pitchFamily="49" charset="0"/>
+                <a:cs typeface="Courier New" panose="02070309020205020404" pitchFamily="49" charset="0"/>
+              </a:rPr>
+              <a:t>public</a:t>
+            </a:r>
+            <a:r>
+              <a:rPr lang="en-US" sz="1800" dirty="0">
+                <a:latin typeface="Courier New" panose="02070309020205020404" pitchFamily="49" charset="0"/>
+                <a:cs typeface="Courier New" panose="02070309020205020404" pitchFamily="49" charset="0"/>
+              </a:rPr>
+              <a:t> String name;</a:t>
+            </a:r>
+          </a:p>
+          <a:p>
+            <a:pPr marL="0" lvl="0" indent="0" algn="l" rtl="0">
+              <a:spcBef>
+                <a:spcPts val="0"/>
+              </a:spcBef>
+              <a:spcAft>
+                <a:spcPts val="0"/>
+              </a:spcAft>
+              <a:buSzPts val="2800"/>
+              <a:buNone/>
+            </a:pPr>
+            <a:r>
+              <a:rPr lang="en-US" sz="1800" dirty="0">
+                <a:latin typeface="Courier New" panose="02070309020205020404" pitchFamily="49" charset="0"/>
+                <a:cs typeface="Courier New" panose="02070309020205020404" pitchFamily="49" charset="0"/>
+              </a:rPr>
+              <a:t>     </a:t>
+            </a:r>
+            <a:r>
+              <a:rPr lang="en-US" sz="1800" b="1" dirty="0">
+                <a:latin typeface="Courier New" panose="02070309020205020404" pitchFamily="49" charset="0"/>
+                <a:cs typeface="Courier New" panose="02070309020205020404" pitchFamily="49" charset="0"/>
+              </a:rPr>
+              <a:t>public</a:t>
+            </a:r>
+            <a:r>
+              <a:rPr lang="en-US" sz="1800" dirty="0">
+                <a:latin typeface="Courier New" panose="02070309020205020404" pitchFamily="49" charset="0"/>
+                <a:cs typeface="Courier New" panose="02070309020205020404" pitchFamily="49" charset="0"/>
+              </a:rPr>
+              <a:t> </a:t>
+            </a:r>
+            <a:r>
+              <a:rPr lang="en-US" sz="1800" b="1" dirty="0">
+                <a:latin typeface="Courier New" panose="02070309020205020404" pitchFamily="49" charset="0"/>
+                <a:cs typeface="Courier New" panose="02070309020205020404" pitchFamily="49" charset="0"/>
+              </a:rPr>
+              <a:t>int</a:t>
+            </a:r>
+            <a:r>
+              <a:rPr lang="en-US" sz="1800" dirty="0">
+                <a:latin typeface="Courier New" panose="02070309020205020404" pitchFamily="49" charset="0"/>
+                <a:cs typeface="Courier New" panose="02070309020205020404" pitchFamily="49" charset="0"/>
+              </a:rPr>
+              <a:t> health;</a:t>
+            </a:r>
+          </a:p>
+          <a:p>
+            <a:pPr marL="0" lvl="0" indent="0" algn="l" rtl="0">
+              <a:spcBef>
+                <a:spcPts val="0"/>
+              </a:spcBef>
+              <a:spcAft>
+                <a:spcPts val="0"/>
+              </a:spcAft>
+              <a:buSzPts val="2800"/>
+              <a:buNone/>
+            </a:pPr>
+            <a:r>
+              <a:rPr lang="en-US" sz="1800" dirty="0">
+                <a:latin typeface="Courier New" panose="02070309020205020404" pitchFamily="49" charset="0"/>
+                <a:cs typeface="Courier New" panose="02070309020205020404" pitchFamily="49" charset="0"/>
+              </a:rPr>
+              <a:t>	</a:t>
+            </a:r>
+          </a:p>
+          <a:p>
+            <a:pPr marL="0" lvl="0" indent="0" algn="l" rtl="0">
+              <a:spcBef>
+                <a:spcPts val="0"/>
+              </a:spcBef>
+              <a:spcAft>
+                <a:spcPts val="0"/>
+              </a:spcAft>
+              <a:buSzPts val="2800"/>
+              <a:buNone/>
+            </a:pPr>
+            <a:r>
+              <a:rPr lang="en-US" sz="1800" dirty="0">
+                <a:latin typeface="Courier New" panose="02070309020205020404" pitchFamily="49" charset="0"/>
+                <a:cs typeface="Courier New" panose="02070309020205020404" pitchFamily="49" charset="0"/>
+              </a:rPr>
+              <a:t>     </a:t>
+            </a:r>
+            <a:r>
+              <a:rPr lang="en-US" sz="1800" b="1" dirty="0">
+                <a:latin typeface="Courier New" panose="02070309020205020404" pitchFamily="49" charset="0"/>
+                <a:cs typeface="Courier New" panose="02070309020205020404" pitchFamily="49" charset="0"/>
+              </a:rPr>
+              <a:t>public</a:t>
+            </a:r>
+            <a:r>
+              <a:rPr lang="en-US" sz="1800" dirty="0">
+                <a:latin typeface="Courier New" panose="02070309020205020404" pitchFamily="49" charset="0"/>
+                <a:cs typeface="Courier New" panose="02070309020205020404" pitchFamily="49" charset="0"/>
+              </a:rPr>
+              <a:t> Creature () { }</a:t>
+            </a:r>
+          </a:p>
+          <a:p>
+            <a:pPr marL="0" lvl="0" indent="0" algn="l" rtl="0">
+              <a:spcBef>
+                <a:spcPts val="0"/>
+              </a:spcBef>
+              <a:spcAft>
+                <a:spcPts val="0"/>
+              </a:spcAft>
+              <a:buSzPts val="2800"/>
+              <a:buNone/>
+            </a:pPr>
+            <a:endParaRPr lang="en-US" sz="1800" dirty="0">
+              <a:latin typeface="Courier New" panose="02070309020205020404" pitchFamily="49" charset="0"/>
+              <a:cs typeface="Courier New" panose="02070309020205020404" pitchFamily="49" charset="0"/>
+            </a:endParaRPr>
+          </a:p>
+          <a:p>
+            <a:pPr marL="0" lvl="0" indent="0" algn="l" rtl="0">
+              <a:spcBef>
+                <a:spcPts val="0"/>
+              </a:spcBef>
+              <a:spcAft>
+                <a:spcPts val="0"/>
+              </a:spcAft>
+              <a:buSzPts val="2800"/>
+              <a:buNone/>
+            </a:pPr>
+            <a:r>
+              <a:rPr lang="en-US" sz="1800" dirty="0">
+                <a:latin typeface="Courier New" panose="02070309020205020404" pitchFamily="49" charset="0"/>
+                <a:cs typeface="Courier New" panose="02070309020205020404" pitchFamily="49" charset="0"/>
+              </a:rPr>
+              <a:t>     </a:t>
+            </a:r>
+            <a:r>
+              <a:rPr lang="en-US" sz="1800" b="1" dirty="0">
+                <a:latin typeface="Courier New" panose="02070309020205020404" pitchFamily="49" charset="0"/>
+                <a:cs typeface="Courier New" panose="02070309020205020404" pitchFamily="49" charset="0"/>
+              </a:rPr>
+              <a:t>public</a:t>
+            </a:r>
+            <a:r>
+              <a:rPr lang="en-US" sz="1800" dirty="0">
+                <a:latin typeface="Courier New" panose="02070309020205020404" pitchFamily="49" charset="0"/>
+                <a:cs typeface="Courier New" panose="02070309020205020404" pitchFamily="49" charset="0"/>
+              </a:rPr>
+              <a:t> Creature (String name) { </a:t>
+            </a:r>
+            <a:r>
+              <a:rPr lang="en-US" sz="1800" b="1" dirty="0">
+                <a:latin typeface="Courier New" panose="02070309020205020404" pitchFamily="49" charset="0"/>
+                <a:cs typeface="Courier New" panose="02070309020205020404" pitchFamily="49" charset="0"/>
+              </a:rPr>
+              <a:t>this</a:t>
+            </a:r>
+            <a:r>
+              <a:rPr lang="en-US" sz="1800" dirty="0">
+                <a:latin typeface="Courier New" panose="02070309020205020404" pitchFamily="49" charset="0"/>
+                <a:cs typeface="Courier New" panose="02070309020205020404" pitchFamily="49" charset="0"/>
+              </a:rPr>
+              <a:t>.name = name; }</a:t>
+            </a:r>
+          </a:p>
+          <a:p>
+            <a:pPr marL="0" lvl="0" indent="0" algn="l" rtl="0">
+              <a:spcBef>
+                <a:spcPts val="0"/>
+              </a:spcBef>
+              <a:spcAft>
+                <a:spcPts val="0"/>
+              </a:spcAft>
+              <a:buSzPts val="2800"/>
+              <a:buNone/>
+            </a:pPr>
+            <a:endParaRPr lang="en-US" sz="1800" dirty="0">
+              <a:latin typeface="Courier New" panose="02070309020205020404" pitchFamily="49" charset="0"/>
+              <a:cs typeface="Courier New" panose="02070309020205020404" pitchFamily="49" charset="0"/>
+            </a:endParaRPr>
+          </a:p>
+          <a:p>
+            <a:pPr marL="0" lvl="0" indent="0" algn="l" rtl="0">
+              <a:spcBef>
+                <a:spcPts val="0"/>
+              </a:spcBef>
+              <a:spcAft>
+                <a:spcPts val="0"/>
+              </a:spcAft>
+              <a:buSzPts val="2800"/>
+              <a:buNone/>
+            </a:pPr>
+            <a:r>
+              <a:rPr lang="en-US" sz="1800" dirty="0">
+                <a:latin typeface="Courier New" panose="02070309020205020404" pitchFamily="49" charset="0"/>
+                <a:cs typeface="Courier New" panose="02070309020205020404" pitchFamily="49" charset="0"/>
+              </a:rPr>
+              <a:t>     </a:t>
+            </a:r>
+            <a:r>
+              <a:rPr lang="en-US" sz="1800" b="1" dirty="0">
+                <a:latin typeface="Courier New" panose="02070309020205020404" pitchFamily="49" charset="0"/>
+                <a:cs typeface="Courier New" panose="02070309020205020404" pitchFamily="49" charset="0"/>
+              </a:rPr>
+              <a:t>public</a:t>
+            </a:r>
+            <a:r>
+              <a:rPr lang="en-US" sz="1800" dirty="0">
+                <a:latin typeface="Courier New" panose="02070309020205020404" pitchFamily="49" charset="0"/>
+                <a:cs typeface="Courier New" panose="02070309020205020404" pitchFamily="49" charset="0"/>
+              </a:rPr>
+              <a:t> Creature (</a:t>
+            </a:r>
+            <a:r>
+              <a:rPr lang="en-US" sz="1800" b="1" dirty="0">
+                <a:latin typeface="Courier New" panose="02070309020205020404" pitchFamily="49" charset="0"/>
+                <a:cs typeface="Courier New" panose="02070309020205020404" pitchFamily="49" charset="0"/>
+              </a:rPr>
+              <a:t>int</a:t>
+            </a:r>
+            <a:r>
+              <a:rPr lang="en-US" sz="1800" dirty="0">
+                <a:latin typeface="Courier New" panose="02070309020205020404" pitchFamily="49" charset="0"/>
+                <a:cs typeface="Courier New" panose="02070309020205020404" pitchFamily="49" charset="0"/>
+              </a:rPr>
+              <a:t> health) { </a:t>
+            </a:r>
+            <a:r>
+              <a:rPr lang="en-US" sz="1800" b="1" dirty="0" err="1">
+                <a:latin typeface="Courier New" panose="02070309020205020404" pitchFamily="49" charset="0"/>
+                <a:cs typeface="Courier New" panose="02070309020205020404" pitchFamily="49" charset="0"/>
+              </a:rPr>
+              <a:t>this</a:t>
+            </a:r>
+            <a:r>
+              <a:rPr lang="en-US" sz="1800" dirty="0" err="1">
+                <a:latin typeface="Courier New" panose="02070309020205020404" pitchFamily="49" charset="0"/>
+                <a:cs typeface="Courier New" panose="02070309020205020404" pitchFamily="49" charset="0"/>
+              </a:rPr>
+              <a:t>.health</a:t>
+            </a:r>
+            <a:r>
+              <a:rPr lang="en-US" sz="1800" dirty="0">
+                <a:latin typeface="Courier New" panose="02070309020205020404" pitchFamily="49" charset="0"/>
+                <a:cs typeface="Courier New" panose="02070309020205020404" pitchFamily="49" charset="0"/>
+              </a:rPr>
+              <a:t> = health; }</a:t>
+            </a:r>
+          </a:p>
+          <a:p>
+            <a:pPr marL="0" lvl="0" indent="0" algn="l" rtl="0">
+              <a:spcBef>
+                <a:spcPts val="0"/>
+              </a:spcBef>
+              <a:spcAft>
+                <a:spcPts val="0"/>
+              </a:spcAft>
+              <a:buSzPts val="2800"/>
+              <a:buNone/>
+            </a:pPr>
+            <a:endParaRPr lang="en-US" sz="1800" dirty="0">
+              <a:latin typeface="Courier New" panose="02070309020205020404" pitchFamily="49" charset="0"/>
+              <a:cs typeface="Courier New" panose="02070309020205020404" pitchFamily="49" charset="0"/>
+            </a:endParaRPr>
+          </a:p>
+          <a:p>
+            <a:pPr marL="0" lvl="0" indent="0" algn="l" rtl="0">
+              <a:spcBef>
+                <a:spcPts val="0"/>
+              </a:spcBef>
+              <a:spcAft>
+                <a:spcPts val="0"/>
+              </a:spcAft>
+              <a:buSzPts val="2800"/>
+              <a:buNone/>
+            </a:pPr>
+            <a:r>
+              <a:rPr lang="en-US" sz="1800" dirty="0">
+                <a:latin typeface="Courier New" panose="02070309020205020404" pitchFamily="49" charset="0"/>
+                <a:cs typeface="Courier New" panose="02070309020205020404" pitchFamily="49" charset="0"/>
+              </a:rPr>
+              <a:t>     </a:t>
+            </a:r>
+            <a:r>
+              <a:rPr lang="en-US" sz="1800" b="1" dirty="0">
+                <a:latin typeface="Courier New" panose="02070309020205020404" pitchFamily="49" charset="0"/>
+                <a:cs typeface="Courier New" panose="02070309020205020404" pitchFamily="49" charset="0"/>
+              </a:rPr>
+              <a:t>public</a:t>
+            </a:r>
+            <a:r>
+              <a:rPr lang="en-US" sz="1800" dirty="0">
+                <a:latin typeface="Courier New" panose="02070309020205020404" pitchFamily="49" charset="0"/>
+                <a:cs typeface="Courier New" panose="02070309020205020404" pitchFamily="49" charset="0"/>
+              </a:rPr>
+              <a:t> Creature (String name, </a:t>
+            </a:r>
+            <a:r>
+              <a:rPr lang="en-US" sz="1800" b="1" dirty="0">
+                <a:latin typeface="Courier New" panose="02070309020205020404" pitchFamily="49" charset="0"/>
+                <a:cs typeface="Courier New" panose="02070309020205020404" pitchFamily="49" charset="0"/>
+              </a:rPr>
+              <a:t>int</a:t>
+            </a:r>
+            <a:r>
+              <a:rPr lang="en-US" sz="1800" dirty="0">
+                <a:latin typeface="Courier New" panose="02070309020205020404" pitchFamily="49" charset="0"/>
+                <a:cs typeface="Courier New" panose="02070309020205020404" pitchFamily="49" charset="0"/>
+              </a:rPr>
+              <a:t> health) { </a:t>
+            </a:r>
+          </a:p>
+          <a:p>
+            <a:pPr marL="0" lvl="0" indent="0" algn="l" rtl="0">
+              <a:spcBef>
+                <a:spcPts val="0"/>
+              </a:spcBef>
+              <a:spcAft>
+                <a:spcPts val="0"/>
+              </a:spcAft>
+              <a:buSzPts val="2800"/>
+              <a:buNone/>
+            </a:pPr>
+            <a:r>
+              <a:rPr lang="en-US" sz="1800" dirty="0">
+                <a:latin typeface="Courier New" panose="02070309020205020404" pitchFamily="49" charset="0"/>
+                <a:cs typeface="Courier New" panose="02070309020205020404" pitchFamily="49" charset="0"/>
+              </a:rPr>
+              <a:t>	</a:t>
+            </a:r>
+            <a:r>
+              <a:rPr lang="en-US" sz="1800" b="1" dirty="0">
+                <a:latin typeface="Courier New" panose="02070309020205020404" pitchFamily="49" charset="0"/>
+                <a:cs typeface="Courier New" panose="02070309020205020404" pitchFamily="49" charset="0"/>
+              </a:rPr>
+              <a:t>this</a:t>
+            </a:r>
+            <a:r>
+              <a:rPr lang="en-US" sz="1800" dirty="0">
+                <a:latin typeface="Courier New" panose="02070309020205020404" pitchFamily="49" charset="0"/>
+                <a:cs typeface="Courier New" panose="02070309020205020404" pitchFamily="49" charset="0"/>
+              </a:rPr>
+              <a:t>.name = name, </a:t>
+            </a:r>
+            <a:r>
+              <a:rPr lang="en-US" sz="1800" b="1" dirty="0" err="1">
+                <a:latin typeface="Courier New" panose="02070309020205020404" pitchFamily="49" charset="0"/>
+                <a:cs typeface="Courier New" panose="02070309020205020404" pitchFamily="49" charset="0"/>
+              </a:rPr>
+              <a:t>this</a:t>
+            </a:r>
+            <a:r>
+              <a:rPr lang="en-US" sz="1800" dirty="0" err="1">
+                <a:latin typeface="Courier New" panose="02070309020205020404" pitchFamily="49" charset="0"/>
+                <a:cs typeface="Courier New" panose="02070309020205020404" pitchFamily="49" charset="0"/>
+              </a:rPr>
+              <a:t>.health</a:t>
+            </a:r>
+            <a:r>
+              <a:rPr lang="en-US" sz="1800" dirty="0">
+                <a:latin typeface="Courier New" panose="02070309020205020404" pitchFamily="49" charset="0"/>
+                <a:cs typeface="Courier New" panose="02070309020205020404" pitchFamily="49" charset="0"/>
+              </a:rPr>
+              <a:t> = health }</a:t>
+            </a:r>
+          </a:p>
+          <a:p>
+            <a:pPr marL="0" lvl="0" indent="0" algn="l" rtl="0">
+              <a:spcBef>
+                <a:spcPts val="0"/>
+              </a:spcBef>
+              <a:spcAft>
+                <a:spcPts val="0"/>
+              </a:spcAft>
+              <a:buSzPts val="2800"/>
+              <a:buNone/>
+            </a:pPr>
+            <a:r>
+              <a:rPr lang="en-US" sz="1800" dirty="0">
+                <a:latin typeface="Courier New" panose="02070309020205020404" pitchFamily="49" charset="0"/>
+                <a:cs typeface="Courier New" panose="02070309020205020404" pitchFamily="49" charset="0"/>
+              </a:rPr>
+              <a:t>}</a:t>
+            </a:r>
+          </a:p>
+        </p:txBody>
+      </p:sp>
+    </p:spTree>
+    <p:extLst>
+      <p:ext uri="{BB962C8B-B14F-4D97-AF65-F5344CB8AC3E}">
+        <p14:creationId xmlns:p14="http://schemas.microsoft.com/office/powerpoint/2010/main" val="1814177333"/>
+      </p:ext>
+    </p:extLst>
+  </p:cSld>
+  <p:clrMapOvr>
+    <a:masterClrMapping/>
+  </p:clrMapOvr>
+</p:sld>
+</file>
+
+<file path=ppt/slides/slide12.xml><?xml version="1.0" encoding="utf-8"?>
+<p:sld xmlns:a="http://schemas.openxmlformats.org/drawingml/2006/main" xmlns:r="http://schemas.openxmlformats.org/officeDocument/2006/relationships" xmlns:p="http://schemas.openxmlformats.org/presentationml/2006/main">
+  <p:cSld>
+    <p:spTree>
+      <p:nvGrpSpPr>
+        <p:cNvPr id="1" name=""/>
+        <p:cNvGrpSpPr/>
+        <p:nvPr/>
+      </p:nvGrpSpPr>
+      <p:grpSpPr>
+        <a:xfrm>
+          <a:off x="0" y="0"/>
+          <a:ext cx="0" cy="0"/>
+          <a:chOff x="0" y="0"/>
+          <a:chExt cx="0" cy="0"/>
+        </a:xfrm>
+      </p:grpSpPr>
+      <p:sp>
+        <p:nvSpPr>
+          <p:cNvPr id="2" name="Title 1">
+            <a:extLst>
+              <a:ext uri="{FF2B5EF4-FFF2-40B4-BE49-F238E27FC236}">
                 <a16:creationId xmlns:a16="http://schemas.microsoft.com/office/drawing/2014/main" id="{3FAD01AC-E766-4AF1-8D3E-911A6E3F664B}"/>
               </a:ext>
             </a:extLst>
@@ -26632,7 +28547,7 @@
             <a:fld id="{F6728BC2-ACA3-447C-A909-F3F49211C066}" type="slidenum">
               <a:rPr lang="en-US" smtClean="0"/>
               <a:pPr/>
-              <a:t>9</a:t>
+              <a:t>11</a:t>
             </a:fld>
             <a:endParaRPr lang="en-US" dirty="0"/>
           </a:p>
@@ -26880,7 +28795,7 @@
 </p:sld>
 </file>
 
-<file path=ppt/slides/slide11.xml><?xml version="1.0" encoding="utf-8"?>
+<file path=ppt/slides/slide13.xml><?xml version="1.0" encoding="utf-8"?>
 <p:sld xmlns:a="http://schemas.openxmlformats.org/drawingml/2006/main" xmlns:r="http://schemas.openxmlformats.org/officeDocument/2006/relationships" xmlns:p="http://schemas.openxmlformats.org/presentationml/2006/main">
   <p:cSld>
     <p:spTree>
@@ -26974,7 +28889,7 @@
             <a:fld id="{F6728BC2-ACA3-447C-A909-F3F49211C066}" type="slidenum">
               <a:rPr lang="en-US" smtClean="0"/>
               <a:pPr/>
-              <a:t>10</a:t>
+              <a:t>12</a:t>
             </a:fld>
             <a:endParaRPr lang="en-US" dirty="0"/>
           </a:p>
@@ -27246,7 +29161,1612 @@
 </p:sld>
 </file>
 
-<file path=ppt/slides/slide12.xml><?xml version="1.0" encoding="utf-8"?>
+<file path=ppt/slides/slide14.xml><?xml version="1.0" encoding="utf-8"?>
+<p:sld xmlns:a="http://schemas.openxmlformats.org/drawingml/2006/main" xmlns:r="http://schemas.openxmlformats.org/officeDocument/2006/relationships" xmlns:p="http://schemas.openxmlformats.org/presentationml/2006/main">
+  <p:cSld>
+    <p:spTree>
+      <p:nvGrpSpPr>
+        <p:cNvPr id="1" name="Shape 238"/>
+        <p:cNvGrpSpPr/>
+        <p:nvPr/>
+      </p:nvGrpSpPr>
+      <p:grpSpPr>
+        <a:xfrm>
+          <a:off x="0" y="0"/>
+          <a:ext cx="0" cy="0"/>
+          <a:chOff x="0" y="0"/>
+          <a:chExt cx="0" cy="0"/>
+        </a:xfrm>
+      </p:grpSpPr>
+      <p:sp>
+        <p:nvSpPr>
+          <p:cNvPr id="239" name="Google Shape;239;p19"/>
+          <p:cNvSpPr txBox="1">
+            <a:spLocks noGrp="1"/>
+          </p:cNvSpPr>
+          <p:nvPr>
+            <p:ph type="title"/>
+          </p:nvPr>
+        </p:nvSpPr>
+        <p:spPr>
+          <a:xfrm>
+            <a:off x="380010" y="-4950"/>
+            <a:ext cx="6222671" cy="1224150"/>
+          </a:xfrm>
+          <a:prstGeom prst="rect">
+            <a:avLst/>
+          </a:prstGeom>
+          <a:noFill/>
+          <a:ln>
+            <a:noFill/>
+          </a:ln>
+        </p:spPr>
+        <p:txBody>
+          <a:bodyPr spcFirstLastPara="1" wrap="square" lIns="91425" tIns="45700" rIns="91425" bIns="45700" anchor="ctr" anchorCtr="0">
+            <a:noAutofit/>
+          </a:bodyPr>
+          <a:lstStyle/>
+          <a:p>
+            <a:pPr marL="0" lvl="0" indent="0" algn="l" rtl="0">
+              <a:spcBef>
+                <a:spcPts val="0"/>
+              </a:spcBef>
+              <a:spcAft>
+                <a:spcPts val="0"/>
+              </a:spcAft>
+              <a:buClr>
+                <a:schemeClr val="lt1"/>
+              </a:buClr>
+              <a:buSzPts val="2400"/>
+              <a:buFont typeface="Arial"/>
+              <a:buNone/>
+            </a:pPr>
+            <a:r>
+              <a:rPr lang="en-US" dirty="0"/>
+              <a:t>Example</a:t>
+            </a:r>
+            <a:endParaRPr dirty="0"/>
+          </a:p>
+        </p:txBody>
+      </p:sp>
+      <p:sp>
+        <p:nvSpPr>
+          <p:cNvPr id="240" name="Google Shape;240;p19"/>
+          <p:cNvSpPr txBox="1">
+            <a:spLocks noGrp="1"/>
+          </p:cNvSpPr>
+          <p:nvPr>
+            <p:ph type="body" idx="1"/>
+          </p:nvPr>
+        </p:nvSpPr>
+        <p:spPr>
+          <a:xfrm>
+            <a:off x="462013" y="1549667"/>
+            <a:ext cx="8200723" cy="2703287"/>
+          </a:xfrm>
+          <a:prstGeom prst="rect">
+            <a:avLst/>
+          </a:prstGeom>
+          <a:noFill/>
+          <a:ln>
+            <a:noFill/>
+          </a:ln>
+        </p:spPr>
+        <p:txBody>
+          <a:bodyPr spcFirstLastPara="1" wrap="square" lIns="91425" tIns="45700" rIns="91425" bIns="45700" anchor="t" anchorCtr="0">
+            <a:noAutofit/>
+          </a:bodyPr>
+          <a:lstStyle/>
+          <a:p>
+            <a:pPr marL="342900" lvl="0" indent="-342900" algn="l" rtl="0">
+              <a:lnSpc>
+                <a:spcPct val="80000"/>
+              </a:lnSpc>
+              <a:spcBef>
+                <a:spcPts val="0"/>
+              </a:spcBef>
+              <a:spcAft>
+                <a:spcPts val="0"/>
+              </a:spcAft>
+              <a:buSzPts val="2170"/>
+              <a:buChar char="•"/>
+            </a:pPr>
+            <a:r>
+              <a:rPr lang="en-US" sz="2170" dirty="0"/>
+              <a:t>Consider a video game…</a:t>
+            </a:r>
+            <a:endParaRPr dirty="0"/>
+          </a:p>
+          <a:p>
+            <a:pPr marL="742950" lvl="1" indent="-285750" algn="l" rtl="0">
+              <a:lnSpc>
+                <a:spcPct val="80000"/>
+              </a:lnSpc>
+              <a:spcBef>
+                <a:spcPts val="372"/>
+              </a:spcBef>
+              <a:spcAft>
+                <a:spcPts val="0"/>
+              </a:spcAft>
+              <a:buSzPts val="1860"/>
+              <a:buChar char="–"/>
+            </a:pPr>
+            <a:r>
+              <a:rPr lang="en-US" sz="1860" dirty="0"/>
+              <a:t>Non-Player Character object, Monster object, Player object</a:t>
+            </a:r>
+            <a:endParaRPr dirty="0"/>
+          </a:p>
+          <a:p>
+            <a:pPr marL="742950" lvl="1" indent="-285750" algn="l" rtl="0">
+              <a:lnSpc>
+                <a:spcPct val="80000"/>
+              </a:lnSpc>
+              <a:spcBef>
+                <a:spcPts val="372"/>
+              </a:spcBef>
+              <a:spcAft>
+                <a:spcPts val="0"/>
+              </a:spcAft>
+              <a:buSzPts val="1860"/>
+              <a:buChar char="–"/>
+            </a:pPr>
+            <a:r>
+              <a:rPr lang="en-US" sz="1860" dirty="0"/>
+              <a:t>All of these extend the superclass “Creature”</a:t>
+            </a:r>
+            <a:endParaRPr dirty="0"/>
+          </a:p>
+          <a:p>
+            <a:pPr marL="342900" lvl="0" indent="-342900" algn="l" rtl="0">
+              <a:lnSpc>
+                <a:spcPct val="80000"/>
+              </a:lnSpc>
+              <a:spcBef>
+                <a:spcPts val="434"/>
+              </a:spcBef>
+              <a:spcAft>
+                <a:spcPts val="0"/>
+              </a:spcAft>
+              <a:buSzPts val="2170"/>
+              <a:buChar char="•"/>
+            </a:pPr>
+            <a:r>
+              <a:rPr lang="en-US" sz="2170" dirty="0"/>
+              <a:t>All of these objects might have a different behavior upon dying, but they all have a die() behavior. Shared behaviors go in the Creature class, which is inherited (and overridden) in the subclasses</a:t>
+            </a:r>
+            <a:endParaRPr dirty="0"/>
+          </a:p>
+          <a:p>
+            <a:pPr marL="342900" lvl="0" indent="-342900" algn="l" rtl="0">
+              <a:lnSpc>
+                <a:spcPct val="80000"/>
+              </a:lnSpc>
+              <a:spcBef>
+                <a:spcPts val="434"/>
+              </a:spcBef>
+              <a:spcAft>
+                <a:spcPts val="0"/>
+              </a:spcAft>
+              <a:buSzPts val="2170"/>
+              <a:buChar char="•"/>
+            </a:pPr>
+            <a:r>
+              <a:rPr lang="en-US" sz="2170" dirty="0"/>
+              <a:t>A </a:t>
+            </a:r>
+            <a:r>
+              <a:rPr lang="en-US" sz="2170" dirty="0" err="1"/>
+              <a:t>dealDamage</a:t>
+            </a:r>
+            <a:r>
+              <a:rPr lang="en-US" sz="2170" dirty="0"/>
+              <a:t>() method can now be written like this:</a:t>
+            </a:r>
+            <a:endParaRPr dirty="0"/>
+          </a:p>
+        </p:txBody>
+      </p:sp>
+      <p:sp>
+        <p:nvSpPr>
+          <p:cNvPr id="241" name="Google Shape;241;p19"/>
+          <p:cNvSpPr txBox="1">
+            <a:spLocks noGrp="1"/>
+          </p:cNvSpPr>
+          <p:nvPr>
+            <p:ph type="sldNum" idx="12"/>
+          </p:nvPr>
+        </p:nvSpPr>
+        <p:spPr>
+          <a:xfrm>
+            <a:off x="8122757" y="6363712"/>
+            <a:ext cx="861671" cy="365125"/>
+          </a:xfrm>
+          <a:prstGeom prst="rect">
+            <a:avLst/>
+          </a:prstGeom>
+          <a:noFill/>
+          <a:ln>
+            <a:noFill/>
+          </a:ln>
+        </p:spPr>
+        <p:txBody>
+          <a:bodyPr spcFirstLastPara="1" wrap="square" lIns="91425" tIns="45700" rIns="91425" bIns="45700" anchor="ctr" anchorCtr="0">
+            <a:noAutofit/>
+          </a:bodyPr>
+          <a:lstStyle/>
+          <a:p>
+            <a:pPr marL="0" lvl="0" indent="0" algn="r" rtl="0">
+              <a:spcBef>
+                <a:spcPts val="0"/>
+              </a:spcBef>
+              <a:spcAft>
+                <a:spcPts val="0"/>
+              </a:spcAft>
+              <a:buNone/>
+            </a:pPr>
+            <a:fld id="{00000000-1234-1234-1234-123412341234}" type="slidenum">
+              <a:rPr lang="en-US"/>
+              <a:t>13</a:t>
+            </a:fld>
+            <a:endParaRPr/>
+          </a:p>
+        </p:txBody>
+      </p:sp>
+      <p:sp>
+        <p:nvSpPr>
+          <p:cNvPr id="2" name="Rectangle 1">
+            <a:extLst>
+              <a:ext uri="{FF2B5EF4-FFF2-40B4-BE49-F238E27FC236}">
+                <a16:creationId xmlns:a16="http://schemas.microsoft.com/office/drawing/2014/main" id="{0C7E6BA3-20D5-44E9-B3B6-BC41C3943F33}"/>
+              </a:ext>
+            </a:extLst>
+          </p:cNvPr>
+          <p:cNvSpPr/>
+          <p:nvPr/>
+        </p:nvSpPr>
+        <p:spPr>
+          <a:xfrm>
+            <a:off x="643961" y="4321176"/>
+            <a:ext cx="7836826" cy="1974314"/>
+          </a:xfrm>
+          <a:prstGeom prst="rect">
+            <a:avLst/>
+          </a:prstGeom>
+        </p:spPr>
+        <p:style>
+          <a:lnRef idx="1">
+            <a:schemeClr val="accent2"/>
+          </a:lnRef>
+          <a:fillRef idx="2">
+            <a:schemeClr val="accent2"/>
+          </a:fillRef>
+          <a:effectRef idx="1">
+            <a:schemeClr val="accent2"/>
+          </a:effectRef>
+          <a:fontRef idx="minor">
+            <a:schemeClr val="dk1"/>
+          </a:fontRef>
+        </p:style>
+        <p:txBody>
+          <a:bodyPr rtlCol="0" anchor="ctr"/>
+          <a:lstStyle/>
+          <a:p>
+            <a:pPr lvl="0">
+              <a:lnSpc>
+                <a:spcPct val="80000"/>
+              </a:lnSpc>
+              <a:spcBef>
+                <a:spcPts val="302"/>
+              </a:spcBef>
+              <a:buSzPts val="1511"/>
+            </a:pPr>
+            <a:r>
+              <a:rPr lang="en-US" b="1" dirty="0">
+                <a:latin typeface="Courier New"/>
+                <a:ea typeface="Courier New"/>
+                <a:cs typeface="Courier New"/>
+                <a:sym typeface="Courier New"/>
+              </a:rPr>
+              <a:t>public void</a:t>
+            </a:r>
+            <a:r>
+              <a:rPr lang="en-US" dirty="0">
+                <a:latin typeface="Courier New"/>
+                <a:ea typeface="Courier New"/>
+                <a:cs typeface="Courier New"/>
+                <a:sym typeface="Courier New"/>
+              </a:rPr>
+              <a:t> </a:t>
+            </a:r>
+            <a:r>
+              <a:rPr lang="en-US" dirty="0" err="1">
+                <a:latin typeface="Courier New"/>
+                <a:ea typeface="Courier New"/>
+                <a:cs typeface="Courier New"/>
+                <a:sym typeface="Courier New"/>
+              </a:rPr>
+              <a:t>dealDamage</a:t>
+            </a:r>
+            <a:r>
+              <a:rPr lang="en-US" dirty="0">
+                <a:latin typeface="Courier New"/>
+                <a:ea typeface="Courier New"/>
+                <a:cs typeface="Courier New"/>
+                <a:sym typeface="Courier New"/>
+              </a:rPr>
+              <a:t>(Creature target, </a:t>
+            </a:r>
+            <a:r>
+              <a:rPr lang="en-US" b="1" dirty="0">
+                <a:latin typeface="Courier New"/>
+                <a:ea typeface="Courier New"/>
+                <a:cs typeface="Courier New"/>
+                <a:sym typeface="Courier New"/>
+              </a:rPr>
+              <a:t>int</a:t>
+            </a:r>
+            <a:r>
+              <a:rPr lang="en-US" dirty="0">
+                <a:latin typeface="Courier New"/>
+                <a:ea typeface="Courier New"/>
+                <a:cs typeface="Courier New"/>
+                <a:sym typeface="Courier New"/>
+              </a:rPr>
+              <a:t> damage) {</a:t>
+            </a:r>
+            <a:endParaRPr lang="en-US" dirty="0"/>
+          </a:p>
+          <a:p>
+            <a:pPr lvl="0">
+              <a:lnSpc>
+                <a:spcPct val="80000"/>
+              </a:lnSpc>
+              <a:spcBef>
+                <a:spcPts val="302"/>
+              </a:spcBef>
+              <a:buSzPts val="1511"/>
+            </a:pPr>
+            <a:r>
+              <a:rPr lang="en-US" dirty="0">
+                <a:latin typeface="Courier New"/>
+                <a:ea typeface="Courier New"/>
+                <a:cs typeface="Courier New"/>
+                <a:sym typeface="Courier New"/>
+              </a:rPr>
+              <a:t>	</a:t>
+            </a:r>
+            <a:r>
+              <a:rPr lang="en-US" dirty="0" err="1">
+                <a:latin typeface="Courier New"/>
+                <a:ea typeface="Courier New"/>
+                <a:cs typeface="Courier New"/>
+                <a:sym typeface="Courier New"/>
+              </a:rPr>
+              <a:t>target.setHealth</a:t>
+            </a:r>
+            <a:r>
+              <a:rPr lang="en-US" dirty="0">
+                <a:latin typeface="Courier New"/>
+                <a:ea typeface="Courier New"/>
+                <a:cs typeface="Courier New"/>
+                <a:sym typeface="Courier New"/>
+              </a:rPr>
+              <a:t>(</a:t>
+            </a:r>
+            <a:r>
+              <a:rPr lang="en-US" dirty="0" err="1">
+                <a:latin typeface="Courier New"/>
+                <a:ea typeface="Courier New"/>
+                <a:cs typeface="Courier New"/>
+                <a:sym typeface="Courier New"/>
+              </a:rPr>
+              <a:t>target.getHealth</a:t>
+            </a:r>
+            <a:r>
+              <a:rPr lang="en-US" dirty="0">
+                <a:latin typeface="Courier New"/>
+                <a:ea typeface="Courier New"/>
+                <a:cs typeface="Courier New"/>
+                <a:sym typeface="Courier New"/>
+              </a:rPr>
+              <a:t>() - damage);</a:t>
+            </a:r>
+            <a:endParaRPr lang="en-US" dirty="0"/>
+          </a:p>
+          <a:p>
+            <a:pPr lvl="0">
+              <a:lnSpc>
+                <a:spcPct val="80000"/>
+              </a:lnSpc>
+              <a:spcBef>
+                <a:spcPts val="302"/>
+              </a:spcBef>
+              <a:buSzPts val="1511"/>
+            </a:pPr>
+            <a:endParaRPr lang="en-US" dirty="0">
+              <a:latin typeface="Courier New"/>
+              <a:ea typeface="Courier New"/>
+              <a:cs typeface="Courier New"/>
+              <a:sym typeface="Courier New"/>
+            </a:endParaRPr>
+          </a:p>
+          <a:p>
+            <a:pPr lvl="0">
+              <a:lnSpc>
+                <a:spcPct val="80000"/>
+              </a:lnSpc>
+              <a:spcBef>
+                <a:spcPts val="302"/>
+              </a:spcBef>
+              <a:buSzPts val="1511"/>
+            </a:pPr>
+            <a:r>
+              <a:rPr lang="en-US" dirty="0">
+                <a:latin typeface="Courier New"/>
+                <a:ea typeface="Courier New"/>
+                <a:cs typeface="Courier New"/>
+                <a:sym typeface="Courier New"/>
+              </a:rPr>
+              <a:t>	</a:t>
+            </a:r>
+            <a:r>
+              <a:rPr lang="en-US" b="1" dirty="0">
+                <a:latin typeface="Courier New"/>
+                <a:ea typeface="Courier New"/>
+                <a:cs typeface="Courier New"/>
+                <a:sym typeface="Courier New"/>
+              </a:rPr>
+              <a:t>if</a:t>
+            </a:r>
+            <a:r>
+              <a:rPr lang="en-US" dirty="0">
+                <a:latin typeface="Courier New"/>
+                <a:ea typeface="Courier New"/>
+                <a:cs typeface="Courier New"/>
+                <a:sym typeface="Courier New"/>
+              </a:rPr>
+              <a:t> (</a:t>
+            </a:r>
+            <a:r>
+              <a:rPr lang="en-US" dirty="0" err="1">
+                <a:latin typeface="Courier New"/>
+                <a:ea typeface="Courier New"/>
+                <a:cs typeface="Courier New"/>
+                <a:sym typeface="Courier New"/>
+              </a:rPr>
+              <a:t>target.getHealth</a:t>
+            </a:r>
+            <a:r>
+              <a:rPr lang="en-US" dirty="0">
+                <a:latin typeface="Courier New"/>
+                <a:ea typeface="Courier New"/>
+                <a:cs typeface="Courier New"/>
+                <a:sym typeface="Courier New"/>
+              </a:rPr>
+              <a:t>() &lt;= 0)</a:t>
+            </a:r>
+            <a:endParaRPr lang="en-US" dirty="0"/>
+          </a:p>
+          <a:p>
+            <a:pPr lvl="0">
+              <a:lnSpc>
+                <a:spcPct val="80000"/>
+              </a:lnSpc>
+              <a:spcBef>
+                <a:spcPts val="302"/>
+              </a:spcBef>
+              <a:buSzPts val="1511"/>
+            </a:pPr>
+            <a:r>
+              <a:rPr lang="en-US" dirty="0">
+                <a:latin typeface="Courier New"/>
+                <a:ea typeface="Courier New"/>
+                <a:cs typeface="Courier New"/>
+                <a:sym typeface="Courier New"/>
+              </a:rPr>
+              <a:t>		</a:t>
+            </a:r>
+            <a:r>
+              <a:rPr lang="en-US" dirty="0" err="1">
+                <a:latin typeface="Courier New"/>
+                <a:ea typeface="Courier New"/>
+                <a:cs typeface="Courier New"/>
+                <a:sym typeface="Courier New"/>
+              </a:rPr>
+              <a:t>target.die</a:t>
+            </a:r>
+            <a:r>
+              <a:rPr lang="en-US" dirty="0">
+                <a:latin typeface="Courier New"/>
+                <a:ea typeface="Courier New"/>
+                <a:cs typeface="Courier New"/>
+                <a:sym typeface="Courier New"/>
+              </a:rPr>
+              <a:t>();</a:t>
+            </a:r>
+            <a:endParaRPr lang="en-US" dirty="0"/>
+          </a:p>
+          <a:p>
+            <a:pPr lvl="0">
+              <a:lnSpc>
+                <a:spcPct val="80000"/>
+              </a:lnSpc>
+              <a:spcBef>
+                <a:spcPts val="302"/>
+              </a:spcBef>
+              <a:buSzPts val="1511"/>
+            </a:pPr>
+            <a:r>
+              <a:rPr lang="en-US" dirty="0">
+                <a:latin typeface="Courier New"/>
+                <a:ea typeface="Courier New"/>
+                <a:cs typeface="Courier New"/>
+                <a:sym typeface="Courier New"/>
+              </a:rPr>
+              <a:t>}</a:t>
+            </a:r>
+            <a:endParaRPr lang="en-US" dirty="0"/>
+          </a:p>
+        </p:txBody>
+      </p:sp>
+    </p:spTree>
+  </p:cSld>
+  <p:clrMapOvr>
+    <a:masterClrMapping/>
+  </p:clrMapOvr>
+  <p:timing>
+    <p:tnLst>
+      <p:par>
+        <p:cTn id="1" dur="indefinite" restart="never" nodeType="tmRoot">
+          <p:childTnLst>
+            <p:seq concurrent="1" nextAc="seek">
+              <p:cTn id="2" dur="indefinite" nodeType="mainSeq">
+                <p:childTnLst>
+                  <p:par>
+                    <p:cTn id="3" fill="hold">
+                      <p:stCondLst>
+                        <p:cond delay="indefinite"/>
+                      </p:stCondLst>
+                      <p:childTnLst>
+                        <p:par>
+                          <p:cTn id="4" fill="hold">
+                            <p:stCondLst>
+                              <p:cond delay="0"/>
+                            </p:stCondLst>
+                            <p:childTnLst>
+                              <p:par>
+                                <p:cTn id="5" presetID="1" presetClass="entr" presetSubtype="0" fill="hold" grpId="0" nodeType="clickEffect">
+                                  <p:stCondLst>
+                                    <p:cond delay="0"/>
+                                  </p:stCondLst>
+                                  <p:childTnLst>
+                                    <p:set>
+                                      <p:cBhvr>
+                                        <p:cTn id="6" dur="1" fill="hold">
+                                          <p:stCondLst>
+                                            <p:cond delay="0"/>
+                                          </p:stCondLst>
+                                        </p:cTn>
+                                        <p:tgtEl>
+                                          <p:spTgt spid="240">
+                                            <p:txEl>
+                                              <p:pRg st="0" end="0"/>
+                                            </p:txEl>
+                                          </p:spTgt>
+                                        </p:tgtEl>
+                                        <p:attrNameLst>
+                                          <p:attrName>style.visibility</p:attrName>
+                                        </p:attrNameLst>
+                                      </p:cBhvr>
+                                      <p:to>
+                                        <p:strVal val="visible"/>
+                                      </p:to>
+                                    </p:set>
+                                  </p:childTnLst>
+                                </p:cTn>
+                              </p:par>
+                              <p:par>
+                                <p:cTn id="7" presetID="1" presetClass="entr" presetSubtype="0" fill="hold" grpId="0" nodeType="withEffect">
+                                  <p:stCondLst>
+                                    <p:cond delay="0"/>
+                                  </p:stCondLst>
+                                  <p:childTnLst>
+                                    <p:set>
+                                      <p:cBhvr>
+                                        <p:cTn id="8" dur="1" fill="hold">
+                                          <p:stCondLst>
+                                            <p:cond delay="0"/>
+                                          </p:stCondLst>
+                                        </p:cTn>
+                                        <p:tgtEl>
+                                          <p:spTgt spid="240">
+                                            <p:txEl>
+                                              <p:pRg st="1" end="1"/>
+                                            </p:txEl>
+                                          </p:spTgt>
+                                        </p:tgtEl>
+                                        <p:attrNameLst>
+                                          <p:attrName>style.visibility</p:attrName>
+                                        </p:attrNameLst>
+                                      </p:cBhvr>
+                                      <p:to>
+                                        <p:strVal val="visible"/>
+                                      </p:to>
+                                    </p:set>
+                                  </p:childTnLst>
+                                </p:cTn>
+                              </p:par>
+                              <p:par>
+                                <p:cTn id="9" presetID="1" presetClass="entr" presetSubtype="0" fill="hold" grpId="0" nodeType="withEffect">
+                                  <p:stCondLst>
+                                    <p:cond delay="0"/>
+                                  </p:stCondLst>
+                                  <p:childTnLst>
+                                    <p:set>
+                                      <p:cBhvr>
+                                        <p:cTn id="10" dur="1" fill="hold">
+                                          <p:stCondLst>
+                                            <p:cond delay="0"/>
+                                          </p:stCondLst>
+                                        </p:cTn>
+                                        <p:tgtEl>
+                                          <p:spTgt spid="240">
+                                            <p:txEl>
+                                              <p:pRg st="2" end="2"/>
+                                            </p:txEl>
+                                          </p:spTgt>
+                                        </p:tgtEl>
+                                        <p:attrNameLst>
+                                          <p:attrName>style.visibility</p:attrName>
+                                        </p:attrNameLst>
+                                      </p:cBhvr>
+                                      <p:to>
+                                        <p:strVal val="visible"/>
+                                      </p:to>
+                                    </p:set>
+                                  </p:childTnLst>
+                                </p:cTn>
+                              </p:par>
+                            </p:childTnLst>
+                          </p:cTn>
+                        </p:par>
+                      </p:childTnLst>
+                    </p:cTn>
+                  </p:par>
+                  <p:par>
+                    <p:cTn id="11" fill="hold">
+                      <p:stCondLst>
+                        <p:cond delay="indefinite"/>
+                      </p:stCondLst>
+                      <p:childTnLst>
+                        <p:par>
+                          <p:cTn id="12" fill="hold">
+                            <p:stCondLst>
+                              <p:cond delay="0"/>
+                            </p:stCondLst>
+                            <p:childTnLst>
+                              <p:par>
+                                <p:cTn id="13" presetID="1" presetClass="entr" presetSubtype="0" fill="hold" grpId="0" nodeType="clickEffect">
+                                  <p:stCondLst>
+                                    <p:cond delay="0"/>
+                                  </p:stCondLst>
+                                  <p:childTnLst>
+                                    <p:set>
+                                      <p:cBhvr>
+                                        <p:cTn id="14" dur="1" fill="hold">
+                                          <p:stCondLst>
+                                            <p:cond delay="0"/>
+                                          </p:stCondLst>
+                                        </p:cTn>
+                                        <p:tgtEl>
+                                          <p:spTgt spid="240">
+                                            <p:txEl>
+                                              <p:pRg st="3" end="3"/>
+                                            </p:txEl>
+                                          </p:spTgt>
+                                        </p:tgtEl>
+                                        <p:attrNameLst>
+                                          <p:attrName>style.visibility</p:attrName>
+                                        </p:attrNameLst>
+                                      </p:cBhvr>
+                                      <p:to>
+                                        <p:strVal val="visible"/>
+                                      </p:to>
+                                    </p:set>
+                                  </p:childTnLst>
+                                </p:cTn>
+                              </p:par>
+                            </p:childTnLst>
+                          </p:cTn>
+                        </p:par>
+                      </p:childTnLst>
+                    </p:cTn>
+                  </p:par>
+                  <p:par>
+                    <p:cTn id="15" fill="hold">
+                      <p:stCondLst>
+                        <p:cond delay="indefinite"/>
+                      </p:stCondLst>
+                      <p:childTnLst>
+                        <p:par>
+                          <p:cTn id="16" fill="hold">
+                            <p:stCondLst>
+                              <p:cond delay="0"/>
+                            </p:stCondLst>
+                            <p:childTnLst>
+                              <p:par>
+                                <p:cTn id="17" presetID="1" presetClass="entr" presetSubtype="0" fill="hold" grpId="0" nodeType="clickEffect">
+                                  <p:stCondLst>
+                                    <p:cond delay="0"/>
+                                  </p:stCondLst>
+                                  <p:childTnLst>
+                                    <p:set>
+                                      <p:cBhvr>
+                                        <p:cTn id="18" dur="1" fill="hold">
+                                          <p:stCondLst>
+                                            <p:cond delay="0"/>
+                                          </p:stCondLst>
+                                        </p:cTn>
+                                        <p:tgtEl>
+                                          <p:spTgt spid="240">
+                                            <p:txEl>
+                                              <p:pRg st="4" end="4"/>
+                                            </p:txEl>
+                                          </p:spTgt>
+                                        </p:tgtEl>
+                                        <p:attrNameLst>
+                                          <p:attrName>style.visibility</p:attrName>
+                                        </p:attrNameLst>
+                                      </p:cBhvr>
+                                      <p:to>
+                                        <p:strVal val="visible"/>
+                                      </p:to>
+                                    </p:set>
+                                  </p:childTnLst>
+                                </p:cTn>
+                              </p:par>
+                            </p:childTnLst>
+                          </p:cTn>
+                        </p:par>
+                      </p:childTnLst>
+                    </p:cTn>
+                  </p:par>
+                </p:childTnLst>
+              </p:cTn>
+              <p:prevCondLst>
+                <p:cond evt="onPrev" delay="0">
+                  <p:tgtEl>
+                    <p:sldTgt/>
+                  </p:tgtEl>
+                </p:cond>
+              </p:prevCondLst>
+              <p:nextCondLst>
+                <p:cond evt="onNext" delay="0">
+                  <p:tgtEl>
+                    <p:sldTgt/>
+                  </p:tgtEl>
+                </p:cond>
+              </p:nextCondLst>
+            </p:seq>
+          </p:childTnLst>
+        </p:cTn>
+      </p:par>
+    </p:tnLst>
+    <p:bldLst>
+      <p:bldP spid="240" grpId="0" build="p"/>
+    </p:bldLst>
+  </p:timing>
+</p:sld>
+</file>
+
+<file path=ppt/slides/slide15.xml><?xml version="1.0" encoding="utf-8"?>
+<p:sld xmlns:a="http://schemas.openxmlformats.org/drawingml/2006/main" xmlns:r="http://schemas.openxmlformats.org/officeDocument/2006/relationships" xmlns:p="http://schemas.openxmlformats.org/presentationml/2006/main">
+  <p:cSld>
+    <p:spTree>
+      <p:nvGrpSpPr>
+        <p:cNvPr id="1" name="Shape 245"/>
+        <p:cNvGrpSpPr/>
+        <p:nvPr/>
+      </p:nvGrpSpPr>
+      <p:grpSpPr>
+        <a:xfrm>
+          <a:off x="0" y="0"/>
+          <a:ext cx="0" cy="0"/>
+          <a:chOff x="0" y="0"/>
+          <a:chExt cx="0" cy="0"/>
+        </a:xfrm>
+      </p:grpSpPr>
+      <p:sp>
+        <p:nvSpPr>
+          <p:cNvPr id="246" name="Google Shape;246;p20"/>
+          <p:cNvSpPr txBox="1">
+            <a:spLocks noGrp="1"/>
+          </p:cNvSpPr>
+          <p:nvPr>
+            <p:ph type="title"/>
+          </p:nvPr>
+        </p:nvSpPr>
+        <p:spPr>
+          <a:xfrm>
+            <a:off x="380010" y="-4950"/>
+            <a:ext cx="6222671" cy="1224150"/>
+          </a:xfrm>
+          <a:prstGeom prst="rect">
+            <a:avLst/>
+          </a:prstGeom>
+          <a:noFill/>
+          <a:ln>
+            <a:noFill/>
+          </a:ln>
+        </p:spPr>
+        <p:txBody>
+          <a:bodyPr spcFirstLastPara="1" wrap="square" lIns="91425" tIns="45700" rIns="91425" bIns="45700" anchor="ctr" anchorCtr="0">
+            <a:noAutofit/>
+          </a:bodyPr>
+          <a:lstStyle/>
+          <a:p>
+            <a:pPr marL="0" lvl="0" indent="0" algn="l" rtl="0">
+              <a:spcBef>
+                <a:spcPts val="0"/>
+              </a:spcBef>
+              <a:spcAft>
+                <a:spcPts val="0"/>
+              </a:spcAft>
+              <a:buClr>
+                <a:schemeClr val="lt1"/>
+              </a:buClr>
+              <a:buSzPts val="2400"/>
+              <a:buFont typeface="Arial"/>
+              <a:buNone/>
+            </a:pPr>
+            <a:r>
+              <a:rPr lang="en-US"/>
+              <a:t>Without Polymorphism…</a:t>
+            </a:r>
+            <a:endParaRPr/>
+          </a:p>
+        </p:txBody>
+      </p:sp>
+      <p:sp>
+        <p:nvSpPr>
+          <p:cNvPr id="247" name="Google Shape;247;p20"/>
+          <p:cNvSpPr txBox="1">
+            <a:spLocks noGrp="1"/>
+          </p:cNvSpPr>
+          <p:nvPr>
+            <p:ph type="body" idx="1"/>
+          </p:nvPr>
+        </p:nvSpPr>
+        <p:spPr>
+          <a:xfrm>
+            <a:off x="380010" y="1481446"/>
+            <a:ext cx="8383980" cy="4525963"/>
+          </a:xfrm>
+          <a:prstGeom prst="rect">
+            <a:avLst/>
+          </a:prstGeom>
+          <a:noFill/>
+          <a:ln>
+            <a:noFill/>
+          </a:ln>
+        </p:spPr>
+        <p:txBody>
+          <a:bodyPr spcFirstLastPara="1" wrap="square" lIns="91425" tIns="45700" rIns="91425" bIns="45700" anchor="t" anchorCtr="0">
+            <a:noAutofit/>
+          </a:bodyPr>
+          <a:lstStyle/>
+          <a:p>
+            <a:pPr marL="342900" lvl="0" indent="-342900" algn="l" rtl="0">
+              <a:spcBef>
+                <a:spcPts val="0"/>
+              </a:spcBef>
+              <a:spcAft>
+                <a:spcPts val="0"/>
+              </a:spcAft>
+              <a:buSzPts val="2800"/>
+              <a:buChar char="•"/>
+            </a:pPr>
+            <a:r>
+              <a:rPr lang="en-US" dirty="0"/>
+              <a:t>You would need to duplicate code for every possible case.</a:t>
+            </a:r>
+            <a:endParaRPr dirty="0"/>
+          </a:p>
+          <a:p>
+            <a:pPr marL="342900" lvl="0" indent="-165100" algn="l" rtl="0">
+              <a:spcBef>
+                <a:spcPts val="560"/>
+              </a:spcBef>
+              <a:spcAft>
+                <a:spcPts val="0"/>
+              </a:spcAft>
+              <a:buSzPts val="2800"/>
+              <a:buNone/>
+            </a:pPr>
+            <a:endParaRPr dirty="0"/>
+          </a:p>
+          <a:p>
+            <a:pPr marL="342900" lvl="0" indent="-342900" algn="l" rtl="0">
+              <a:spcBef>
+                <a:spcPts val="560"/>
+              </a:spcBef>
+              <a:spcAft>
+                <a:spcPts val="0"/>
+              </a:spcAft>
+              <a:buSzPts val="2800"/>
+              <a:buChar char="•"/>
+            </a:pPr>
+            <a:r>
+              <a:rPr lang="en-US" dirty="0"/>
+              <a:t>Can’t have a broad </a:t>
+            </a:r>
+            <a:r>
+              <a:rPr lang="en-US" dirty="0" err="1"/>
+              <a:t>dealDamage</a:t>
+            </a:r>
+            <a:r>
+              <a:rPr lang="en-US" dirty="0"/>
+              <a:t>() method, you need…</a:t>
+            </a:r>
+            <a:endParaRPr dirty="0"/>
+          </a:p>
+          <a:p>
+            <a:pPr marL="742950" lvl="1" indent="-285750" algn="l" rtl="0">
+              <a:spcBef>
+                <a:spcPts val="480"/>
+              </a:spcBef>
+              <a:spcAft>
+                <a:spcPts val="0"/>
+              </a:spcAft>
+              <a:buSzPts val="2400"/>
+              <a:buChar char="–"/>
+            </a:pPr>
+            <a:r>
+              <a:rPr lang="en-US" dirty="0" err="1"/>
+              <a:t>dealDamageToPlayer</a:t>
+            </a:r>
+            <a:r>
+              <a:rPr lang="en-US" dirty="0"/>
+              <a:t>(Player target, int damage)</a:t>
+            </a:r>
+            <a:endParaRPr dirty="0"/>
+          </a:p>
+          <a:p>
+            <a:pPr marL="742950" lvl="1" indent="-285750" algn="l" rtl="0">
+              <a:spcBef>
+                <a:spcPts val="480"/>
+              </a:spcBef>
+              <a:spcAft>
+                <a:spcPts val="0"/>
+              </a:spcAft>
+              <a:buSzPts val="2400"/>
+              <a:buChar char="–"/>
+            </a:pPr>
+            <a:r>
+              <a:rPr lang="en-US" dirty="0" err="1"/>
+              <a:t>dealDamageToNPC</a:t>
+            </a:r>
+            <a:r>
+              <a:rPr lang="en-US" dirty="0"/>
+              <a:t>(NPC target , int damage)</a:t>
+            </a:r>
+            <a:endParaRPr dirty="0"/>
+          </a:p>
+          <a:p>
+            <a:pPr marL="742950" lvl="1" indent="-285750" algn="l" rtl="0">
+              <a:spcBef>
+                <a:spcPts val="480"/>
+              </a:spcBef>
+              <a:spcAft>
+                <a:spcPts val="0"/>
+              </a:spcAft>
+              <a:buSzPts val="2400"/>
+              <a:buChar char="–"/>
+            </a:pPr>
+            <a:r>
+              <a:rPr lang="en-US" dirty="0" err="1"/>
+              <a:t>dealDamageToMonster</a:t>
+            </a:r>
+            <a:r>
+              <a:rPr lang="en-US" dirty="0"/>
+              <a:t>(Monster target , int damage)</a:t>
+            </a:r>
+            <a:endParaRPr dirty="0"/>
+          </a:p>
+        </p:txBody>
+      </p:sp>
+      <p:sp>
+        <p:nvSpPr>
+          <p:cNvPr id="248" name="Google Shape;248;p20"/>
+          <p:cNvSpPr txBox="1">
+            <a:spLocks noGrp="1"/>
+          </p:cNvSpPr>
+          <p:nvPr>
+            <p:ph type="sldNum" idx="12"/>
+          </p:nvPr>
+        </p:nvSpPr>
+        <p:spPr>
+          <a:xfrm>
+            <a:off x="8122757" y="6363712"/>
+            <a:ext cx="861671" cy="365125"/>
+          </a:xfrm>
+          <a:prstGeom prst="rect">
+            <a:avLst/>
+          </a:prstGeom>
+          <a:noFill/>
+          <a:ln>
+            <a:noFill/>
+          </a:ln>
+        </p:spPr>
+        <p:txBody>
+          <a:bodyPr spcFirstLastPara="1" wrap="square" lIns="91425" tIns="45700" rIns="91425" bIns="45700" anchor="ctr" anchorCtr="0">
+            <a:noAutofit/>
+          </a:bodyPr>
+          <a:lstStyle/>
+          <a:p>
+            <a:pPr marL="0" lvl="0" indent="0" algn="r" rtl="0">
+              <a:spcBef>
+                <a:spcPts val="0"/>
+              </a:spcBef>
+              <a:spcAft>
+                <a:spcPts val="0"/>
+              </a:spcAft>
+              <a:buNone/>
+            </a:pPr>
+            <a:fld id="{00000000-1234-1234-1234-123412341234}" type="slidenum">
+              <a:rPr lang="en-US"/>
+              <a:t>14</a:t>
+            </a:fld>
+            <a:endParaRPr/>
+          </a:p>
+        </p:txBody>
+      </p:sp>
+    </p:spTree>
+  </p:cSld>
+  <p:clrMapOvr>
+    <a:masterClrMapping/>
+  </p:clrMapOvr>
+  <p:timing>
+    <p:tnLst>
+      <p:par>
+        <p:cTn id="1" dur="indefinite" restart="never" nodeType="tmRoot">
+          <p:childTnLst>
+            <p:seq concurrent="1" nextAc="seek">
+              <p:cTn id="2" dur="indefinite" nodeType="mainSeq">
+                <p:childTnLst>
+                  <p:par>
+                    <p:cTn id="3" fill="hold">
+                      <p:stCondLst>
+                        <p:cond delay="indefinite"/>
+                      </p:stCondLst>
+                      <p:childTnLst>
+                        <p:par>
+                          <p:cTn id="4" fill="hold">
+                            <p:stCondLst>
+                              <p:cond delay="0"/>
+                            </p:stCondLst>
+                            <p:childTnLst>
+                              <p:par>
+                                <p:cTn id="5" presetID="1" presetClass="entr" presetSubtype="0" fill="hold" grpId="0" nodeType="clickEffect">
+                                  <p:stCondLst>
+                                    <p:cond delay="0"/>
+                                  </p:stCondLst>
+                                  <p:childTnLst>
+                                    <p:set>
+                                      <p:cBhvr>
+                                        <p:cTn id="6" dur="1" fill="hold">
+                                          <p:stCondLst>
+                                            <p:cond delay="0"/>
+                                          </p:stCondLst>
+                                        </p:cTn>
+                                        <p:tgtEl>
+                                          <p:spTgt spid="247">
+                                            <p:txEl>
+                                              <p:pRg st="0" end="0"/>
+                                            </p:txEl>
+                                          </p:spTgt>
+                                        </p:tgtEl>
+                                        <p:attrNameLst>
+                                          <p:attrName>style.visibility</p:attrName>
+                                        </p:attrNameLst>
+                                      </p:cBhvr>
+                                      <p:to>
+                                        <p:strVal val="visible"/>
+                                      </p:to>
+                                    </p:set>
+                                  </p:childTnLst>
+                                </p:cTn>
+                              </p:par>
+                            </p:childTnLst>
+                          </p:cTn>
+                        </p:par>
+                      </p:childTnLst>
+                    </p:cTn>
+                  </p:par>
+                  <p:par>
+                    <p:cTn id="7" fill="hold">
+                      <p:stCondLst>
+                        <p:cond delay="indefinite"/>
+                      </p:stCondLst>
+                      <p:childTnLst>
+                        <p:par>
+                          <p:cTn id="8" fill="hold">
+                            <p:stCondLst>
+                              <p:cond delay="0"/>
+                            </p:stCondLst>
+                            <p:childTnLst>
+                              <p:par>
+                                <p:cTn id="9" presetID="1" presetClass="entr" presetSubtype="0" fill="hold" grpId="0" nodeType="clickEffect">
+                                  <p:stCondLst>
+                                    <p:cond delay="0"/>
+                                  </p:stCondLst>
+                                  <p:childTnLst>
+                                    <p:set>
+                                      <p:cBhvr>
+                                        <p:cTn id="10" dur="1" fill="hold">
+                                          <p:stCondLst>
+                                            <p:cond delay="0"/>
+                                          </p:stCondLst>
+                                        </p:cTn>
+                                        <p:tgtEl>
+                                          <p:spTgt spid="247">
+                                            <p:txEl>
+                                              <p:pRg st="2" end="2"/>
+                                            </p:txEl>
+                                          </p:spTgt>
+                                        </p:tgtEl>
+                                        <p:attrNameLst>
+                                          <p:attrName>style.visibility</p:attrName>
+                                        </p:attrNameLst>
+                                      </p:cBhvr>
+                                      <p:to>
+                                        <p:strVal val="visible"/>
+                                      </p:to>
+                                    </p:set>
+                                  </p:childTnLst>
+                                </p:cTn>
+                              </p:par>
+                              <p:par>
+                                <p:cTn id="11" presetID="1" presetClass="entr" presetSubtype="0" fill="hold" grpId="0" nodeType="withEffect">
+                                  <p:stCondLst>
+                                    <p:cond delay="0"/>
+                                  </p:stCondLst>
+                                  <p:childTnLst>
+                                    <p:set>
+                                      <p:cBhvr>
+                                        <p:cTn id="12" dur="1" fill="hold">
+                                          <p:stCondLst>
+                                            <p:cond delay="0"/>
+                                          </p:stCondLst>
+                                        </p:cTn>
+                                        <p:tgtEl>
+                                          <p:spTgt spid="247">
+                                            <p:txEl>
+                                              <p:pRg st="3" end="3"/>
+                                            </p:txEl>
+                                          </p:spTgt>
+                                        </p:tgtEl>
+                                        <p:attrNameLst>
+                                          <p:attrName>style.visibility</p:attrName>
+                                        </p:attrNameLst>
+                                      </p:cBhvr>
+                                      <p:to>
+                                        <p:strVal val="visible"/>
+                                      </p:to>
+                                    </p:set>
+                                  </p:childTnLst>
+                                </p:cTn>
+                              </p:par>
+                              <p:par>
+                                <p:cTn id="13" presetID="1" presetClass="entr" presetSubtype="0" fill="hold" grpId="0" nodeType="withEffect">
+                                  <p:stCondLst>
+                                    <p:cond delay="0"/>
+                                  </p:stCondLst>
+                                  <p:childTnLst>
+                                    <p:set>
+                                      <p:cBhvr>
+                                        <p:cTn id="14" dur="1" fill="hold">
+                                          <p:stCondLst>
+                                            <p:cond delay="0"/>
+                                          </p:stCondLst>
+                                        </p:cTn>
+                                        <p:tgtEl>
+                                          <p:spTgt spid="247">
+                                            <p:txEl>
+                                              <p:pRg st="4" end="4"/>
+                                            </p:txEl>
+                                          </p:spTgt>
+                                        </p:tgtEl>
+                                        <p:attrNameLst>
+                                          <p:attrName>style.visibility</p:attrName>
+                                        </p:attrNameLst>
+                                      </p:cBhvr>
+                                      <p:to>
+                                        <p:strVal val="visible"/>
+                                      </p:to>
+                                    </p:set>
+                                  </p:childTnLst>
+                                </p:cTn>
+                              </p:par>
+                              <p:par>
+                                <p:cTn id="15" presetID="1" presetClass="entr" presetSubtype="0" fill="hold" grpId="0" nodeType="withEffect">
+                                  <p:stCondLst>
+                                    <p:cond delay="0"/>
+                                  </p:stCondLst>
+                                  <p:childTnLst>
+                                    <p:set>
+                                      <p:cBhvr>
+                                        <p:cTn id="16" dur="1" fill="hold">
+                                          <p:stCondLst>
+                                            <p:cond delay="0"/>
+                                          </p:stCondLst>
+                                        </p:cTn>
+                                        <p:tgtEl>
+                                          <p:spTgt spid="247">
+                                            <p:txEl>
+                                              <p:pRg st="5" end="5"/>
+                                            </p:txEl>
+                                          </p:spTgt>
+                                        </p:tgtEl>
+                                        <p:attrNameLst>
+                                          <p:attrName>style.visibility</p:attrName>
+                                        </p:attrNameLst>
+                                      </p:cBhvr>
+                                      <p:to>
+                                        <p:strVal val="visible"/>
+                                      </p:to>
+                                    </p:set>
+                                  </p:childTnLst>
+                                </p:cTn>
+                              </p:par>
+                            </p:childTnLst>
+                          </p:cTn>
+                        </p:par>
+                      </p:childTnLst>
+                    </p:cTn>
+                  </p:par>
+                </p:childTnLst>
+              </p:cTn>
+              <p:prevCondLst>
+                <p:cond evt="onPrev" delay="0">
+                  <p:tgtEl>
+                    <p:sldTgt/>
+                  </p:tgtEl>
+                </p:cond>
+              </p:prevCondLst>
+              <p:nextCondLst>
+                <p:cond evt="onNext" delay="0">
+                  <p:tgtEl>
+                    <p:sldTgt/>
+                  </p:tgtEl>
+                </p:cond>
+              </p:nextCondLst>
+            </p:seq>
+          </p:childTnLst>
+        </p:cTn>
+      </p:par>
+    </p:tnLst>
+    <p:bldLst>
+      <p:bldP spid="247" grpId="0" build="p"/>
+    </p:bldLst>
+  </p:timing>
+</p:sld>
+</file>
+
+<file path=ppt/slides/slide16.xml><?xml version="1.0" encoding="utf-8"?>
+<p:sld xmlns:a="http://schemas.openxmlformats.org/drawingml/2006/main" xmlns:r="http://schemas.openxmlformats.org/officeDocument/2006/relationships" xmlns:p="http://schemas.openxmlformats.org/presentationml/2006/main">
+  <p:cSld>
+    <p:spTree>
+      <p:nvGrpSpPr>
+        <p:cNvPr id="1" name="Shape 231"/>
+        <p:cNvGrpSpPr/>
+        <p:nvPr/>
+      </p:nvGrpSpPr>
+      <p:grpSpPr>
+        <a:xfrm>
+          <a:off x="0" y="0"/>
+          <a:ext cx="0" cy="0"/>
+          <a:chOff x="0" y="0"/>
+          <a:chExt cx="0" cy="0"/>
+        </a:xfrm>
+      </p:grpSpPr>
+      <p:sp>
+        <p:nvSpPr>
+          <p:cNvPr id="232" name="Google Shape;232;p18"/>
+          <p:cNvSpPr txBox="1">
+            <a:spLocks noGrp="1"/>
+          </p:cNvSpPr>
+          <p:nvPr>
+            <p:ph type="title"/>
+          </p:nvPr>
+        </p:nvSpPr>
+        <p:spPr>
+          <a:xfrm>
+            <a:off x="380010" y="-4950"/>
+            <a:ext cx="6222671" cy="1224150"/>
+          </a:xfrm>
+          <a:prstGeom prst="rect">
+            <a:avLst/>
+          </a:prstGeom>
+          <a:noFill/>
+          <a:ln>
+            <a:noFill/>
+          </a:ln>
+        </p:spPr>
+        <p:txBody>
+          <a:bodyPr spcFirstLastPara="1" wrap="square" lIns="91425" tIns="45700" rIns="91425" bIns="45700" anchor="ctr" anchorCtr="0">
+            <a:noAutofit/>
+          </a:bodyPr>
+          <a:lstStyle/>
+          <a:p>
+            <a:pPr marL="0" lvl="0" indent="0" algn="l" rtl="0">
+              <a:spcBef>
+                <a:spcPts val="0"/>
+              </a:spcBef>
+              <a:spcAft>
+                <a:spcPts val="0"/>
+              </a:spcAft>
+              <a:buClr>
+                <a:schemeClr val="lt1"/>
+              </a:buClr>
+              <a:buSzPts val="2400"/>
+              <a:buFont typeface="Arial"/>
+              <a:buNone/>
+            </a:pPr>
+            <a:r>
+              <a:rPr lang="en-US" dirty="0"/>
+              <a:t>**Method Overloading Preference</a:t>
+            </a:r>
+            <a:endParaRPr dirty="0"/>
+          </a:p>
+        </p:txBody>
+      </p:sp>
+      <p:sp>
+        <p:nvSpPr>
+          <p:cNvPr id="233" name="Google Shape;233;p18"/>
+          <p:cNvSpPr txBox="1">
+            <a:spLocks noGrp="1"/>
+          </p:cNvSpPr>
+          <p:nvPr>
+            <p:ph type="body" idx="1"/>
+          </p:nvPr>
+        </p:nvSpPr>
+        <p:spPr>
+          <a:xfrm>
+            <a:off x="380010" y="1481446"/>
+            <a:ext cx="8383980" cy="4882266"/>
+          </a:xfrm>
+          <a:prstGeom prst="rect">
+            <a:avLst/>
+          </a:prstGeom>
+          <a:noFill/>
+          <a:ln>
+            <a:noFill/>
+          </a:ln>
+        </p:spPr>
+        <p:txBody>
+          <a:bodyPr spcFirstLastPara="1" wrap="square" lIns="91425" tIns="45700" rIns="91425" bIns="45700" anchor="t" anchorCtr="0">
+            <a:noAutofit/>
+          </a:bodyPr>
+          <a:lstStyle/>
+          <a:p>
+            <a:pPr marL="342900" lvl="0" indent="-342900" algn="l" rtl="0">
+              <a:spcBef>
+                <a:spcPts val="0"/>
+              </a:spcBef>
+              <a:spcAft>
+                <a:spcPts val="0"/>
+              </a:spcAft>
+              <a:buSzPts val="2800"/>
+              <a:buChar char="•"/>
+            </a:pPr>
+            <a:r>
+              <a:rPr lang="en-US" sz="2400" dirty="0"/>
+              <a:t>When overloading a method, there is a certain order of precedence for which method version is invoked:</a:t>
+            </a:r>
+          </a:p>
+          <a:p>
+            <a:pPr marL="0" lvl="0" indent="0" algn="l" rtl="0">
+              <a:spcBef>
+                <a:spcPts val="0"/>
+              </a:spcBef>
+              <a:spcAft>
+                <a:spcPts val="0"/>
+              </a:spcAft>
+              <a:buSzPts val="2800"/>
+              <a:buNone/>
+            </a:pPr>
+            <a:endParaRPr lang="en-US" sz="2400" dirty="0"/>
+          </a:p>
+          <a:p>
+            <a:pPr lvl="0" indent="-457200" algn="l" rtl="0">
+              <a:spcBef>
+                <a:spcPts val="0"/>
+              </a:spcBef>
+              <a:spcAft>
+                <a:spcPts val="0"/>
+              </a:spcAft>
+              <a:buSzPts val="2800"/>
+              <a:buFont typeface="+mj-lt"/>
+              <a:buAutoNum type="arabicPeriod"/>
+            </a:pPr>
+            <a:r>
+              <a:rPr lang="en-US" sz="2400" dirty="0"/>
+              <a:t>Exact datatype match</a:t>
+            </a:r>
+          </a:p>
+          <a:p>
+            <a:pPr lvl="0" indent="-457200" algn="l" rtl="0">
+              <a:spcBef>
+                <a:spcPts val="0"/>
+              </a:spcBef>
+              <a:spcAft>
+                <a:spcPts val="0"/>
+              </a:spcAft>
+              <a:buSzPts val="2800"/>
+              <a:buFont typeface="+mj-lt"/>
+              <a:buAutoNum type="arabicPeriod"/>
+            </a:pPr>
+            <a:r>
+              <a:rPr lang="en-US" sz="2400" dirty="0"/>
+              <a:t>Implicit Casting (type conversion)</a:t>
+            </a:r>
+          </a:p>
+          <a:p>
+            <a:pPr lvl="0" indent="-457200" algn="l" rtl="0">
+              <a:spcBef>
+                <a:spcPts val="0"/>
+              </a:spcBef>
+              <a:spcAft>
+                <a:spcPts val="0"/>
+              </a:spcAft>
+              <a:buSzPts val="2800"/>
+              <a:buFont typeface="+mj-lt"/>
+              <a:buAutoNum type="arabicPeriod"/>
+            </a:pPr>
+            <a:r>
+              <a:rPr lang="en-US" sz="2400" dirty="0"/>
+              <a:t>Boxing (auto-boxing or unboxing)</a:t>
+            </a:r>
+          </a:p>
+          <a:p>
+            <a:pPr lvl="0" indent="-457200" algn="l" rtl="0">
+              <a:spcBef>
+                <a:spcPts val="0"/>
+              </a:spcBef>
+              <a:spcAft>
+                <a:spcPts val="0"/>
+              </a:spcAft>
+              <a:buSzPts val="2800"/>
+              <a:buFont typeface="+mj-lt"/>
+              <a:buAutoNum type="arabicPeriod"/>
+            </a:pPr>
+            <a:r>
+              <a:rPr lang="en-US" sz="2400" dirty="0"/>
+              <a:t>Varargs…</a:t>
+            </a:r>
+          </a:p>
+          <a:p>
+            <a:pPr lvl="0" indent="-457200" algn="l" rtl="0">
+              <a:spcBef>
+                <a:spcPts val="0"/>
+              </a:spcBef>
+              <a:spcAft>
+                <a:spcPts val="0"/>
+              </a:spcAft>
+              <a:buSzPts val="2800"/>
+              <a:buFont typeface="+mj-lt"/>
+              <a:buAutoNum type="arabicPeriod"/>
+            </a:pPr>
+            <a:endParaRPr lang="en-US" sz="2400" dirty="0"/>
+          </a:p>
+          <a:p>
+            <a:pPr lvl="0" indent="-457200" algn="l" rtl="0">
+              <a:spcBef>
+                <a:spcPts val="0"/>
+              </a:spcBef>
+              <a:spcAft>
+                <a:spcPts val="0"/>
+              </a:spcAft>
+              <a:buSzPts val="2800"/>
+              <a:buFont typeface="+mj-lt"/>
+              <a:buAutoNum type="arabicPeriod"/>
+            </a:pPr>
+            <a:endParaRPr lang="en-US" sz="2400" dirty="0"/>
+          </a:p>
+          <a:p>
+            <a:pPr lvl="0" indent="-457200" algn="l" rtl="0">
+              <a:spcBef>
+                <a:spcPts val="0"/>
+              </a:spcBef>
+              <a:spcAft>
+                <a:spcPts val="0"/>
+              </a:spcAft>
+              <a:buSzPts val="2800"/>
+              <a:buFont typeface="+mj-lt"/>
+              <a:buAutoNum type="arabicPeriod"/>
+            </a:pPr>
+            <a:endParaRPr lang="en-US" sz="2400" dirty="0"/>
+          </a:p>
+          <a:p>
+            <a:pPr marL="0" lvl="0" indent="0" algn="l" rtl="0">
+              <a:spcBef>
+                <a:spcPts val="0"/>
+              </a:spcBef>
+              <a:spcAft>
+                <a:spcPts val="0"/>
+              </a:spcAft>
+              <a:buSzPts val="2800"/>
+              <a:buNone/>
+            </a:pPr>
+            <a:r>
+              <a:rPr lang="en-US" sz="2000" dirty="0"/>
+              <a:t>**Please note: Usually an exact match should be supplied, and as such, this preference list is usually a niche circumstance.</a:t>
+            </a:r>
+          </a:p>
+        </p:txBody>
+      </p:sp>
+      <p:sp>
+        <p:nvSpPr>
+          <p:cNvPr id="234" name="Google Shape;234;p18"/>
+          <p:cNvSpPr txBox="1">
+            <a:spLocks noGrp="1"/>
+          </p:cNvSpPr>
+          <p:nvPr>
+            <p:ph type="sldNum" idx="12"/>
+          </p:nvPr>
+        </p:nvSpPr>
+        <p:spPr>
+          <a:xfrm>
+            <a:off x="8122757" y="6363712"/>
+            <a:ext cx="861671" cy="365125"/>
+          </a:xfrm>
+          <a:prstGeom prst="rect">
+            <a:avLst/>
+          </a:prstGeom>
+          <a:noFill/>
+          <a:ln>
+            <a:noFill/>
+          </a:ln>
+        </p:spPr>
+        <p:txBody>
+          <a:bodyPr spcFirstLastPara="1" wrap="square" lIns="91425" tIns="45700" rIns="91425" bIns="45700" anchor="ctr" anchorCtr="0">
+            <a:noAutofit/>
+          </a:bodyPr>
+          <a:lstStyle/>
+          <a:p>
+            <a:pPr marL="0" lvl="0" indent="0" algn="r" rtl="0">
+              <a:spcBef>
+                <a:spcPts val="0"/>
+              </a:spcBef>
+              <a:spcAft>
+                <a:spcPts val="0"/>
+              </a:spcAft>
+              <a:buNone/>
+            </a:pPr>
+            <a:fld id="{00000000-1234-1234-1234-123412341234}" type="slidenum">
+              <a:rPr lang="en-US"/>
+              <a:t>15</a:t>
+            </a:fld>
+            <a:endParaRPr/>
+          </a:p>
+        </p:txBody>
+      </p:sp>
+    </p:spTree>
+    <p:extLst>
+      <p:ext uri="{BB962C8B-B14F-4D97-AF65-F5344CB8AC3E}">
+        <p14:creationId xmlns:p14="http://schemas.microsoft.com/office/powerpoint/2010/main" val="3131134764"/>
+      </p:ext>
+    </p:extLst>
+  </p:cSld>
+  <p:clrMapOvr>
+    <a:masterClrMapping/>
+  </p:clrMapOvr>
+</p:sld>
+</file>
+
+<file path=ppt/slides/slide17.xml><?xml version="1.0" encoding="utf-8"?>
 <p:sld xmlns:a="http://schemas.openxmlformats.org/drawingml/2006/main" xmlns:r="http://schemas.openxmlformats.org/officeDocument/2006/relationships" xmlns:p="http://schemas.openxmlformats.org/presentationml/2006/main">
   <p:cSld>
     <p:spTree>
@@ -27303,7 +30823,7 @@
             </a:pPr>
             <a:fld id="{00000000-1234-1234-1234-123412341234}" type="slidenum">
               <a:rPr lang="en-US"/>
-              <a:t>11</a:t>
+              <a:t>16</a:t>
             </a:fld>
             <a:endParaRPr/>
           </a:p>
@@ -35774,7 +39294,7 @@
   <p:cSld>
     <p:spTree>
       <p:nvGrpSpPr>
-        <p:cNvPr id="1" name=""/>
+        <p:cNvPr id="1" name="Shape 224"/>
         <p:cNvGrpSpPr/>
         <p:nvPr/>
       </p:nvGrpSpPr>
@@ -35788,156 +39308,23 @@
       </p:grpSpPr>
       <p:sp>
         <p:nvSpPr>
-          <p:cNvPr id="2" name="Title 1">
-            <a:extLst>
-              <a:ext uri="{FF2B5EF4-FFF2-40B4-BE49-F238E27FC236}">
-                <a16:creationId xmlns:a16="http://schemas.microsoft.com/office/drawing/2014/main" id="{CB270EC6-F6C1-4C24-95AD-8FF1F21693FE}"/>
-              </a:ext>
-            </a:extLst>
-          </p:cNvPr>
-          <p:cNvSpPr>
-            <a:spLocks noGrp="1"/>
-          </p:cNvSpPr>
-          <p:nvPr>
-            <p:ph type="title"/>
-          </p:nvPr>
-        </p:nvSpPr>
-        <p:spPr/>
-        <p:txBody>
-          <a:bodyPr/>
-          <a:lstStyle/>
-          <a:p>
-            <a:r>
-              <a:rPr lang="en-US" dirty="0"/>
-              <a:t>Overloading</a:t>
-            </a:r>
-          </a:p>
-        </p:txBody>
-      </p:sp>
-      <p:sp>
-        <p:nvSpPr>
-          <p:cNvPr id="3" name="Text Placeholder 2">
-            <a:extLst>
-              <a:ext uri="{FF2B5EF4-FFF2-40B4-BE49-F238E27FC236}">
-                <a16:creationId xmlns:a16="http://schemas.microsoft.com/office/drawing/2014/main" id="{F7CFAE28-6DEE-4061-B15A-C0B69A35AB6A}"/>
-              </a:ext>
-            </a:extLst>
-          </p:cNvPr>
-          <p:cNvSpPr>
+          <p:cNvPr id="226" name="Google Shape;226;p17"/>
+          <p:cNvSpPr txBox="1">
             <a:spLocks noGrp="1"/>
           </p:cNvSpPr>
           <p:nvPr>
             <p:ph type="body" idx="1"/>
           </p:nvPr>
         </p:nvSpPr>
-        <p:spPr/>
-        <p:txBody>
-          <a:bodyPr/>
-          <a:lstStyle/>
-          <a:p>
-            <a:r>
-              <a:rPr lang="en-US" dirty="0"/>
-              <a:t>Two methods in the same class with the </a:t>
-            </a:r>
-            <a:r>
-              <a:rPr lang="en-US" i="1" dirty="0"/>
-              <a:t>same name </a:t>
-            </a:r>
-            <a:r>
-              <a:rPr lang="en-US" dirty="0"/>
-              <a:t>but different parameter lists. </a:t>
-            </a:r>
-          </a:p>
-          <a:p>
-            <a:endParaRPr lang="en-US" dirty="0"/>
-          </a:p>
-          <a:p>
-            <a:endParaRPr lang="en-US" dirty="0"/>
-          </a:p>
-          <a:p>
-            <a:endParaRPr lang="en-US" dirty="0"/>
-          </a:p>
-          <a:p>
-            <a:endParaRPr lang="en-US" dirty="0"/>
-          </a:p>
-          <a:p>
-            <a:endParaRPr lang="en-US" dirty="0"/>
-          </a:p>
-          <a:p>
-            <a:endParaRPr lang="en-US" dirty="0"/>
-          </a:p>
-          <a:p>
-            <a:r>
-              <a:rPr lang="en-US" dirty="0"/>
-              <a:t>Can be performed with methods and constructors</a:t>
-            </a:r>
-          </a:p>
-          <a:p>
-            <a:pPr marL="50800" indent="0">
-              <a:buNone/>
-            </a:pPr>
-            <a:endParaRPr lang="en-US" dirty="0"/>
-          </a:p>
-        </p:txBody>
-      </p:sp>
-      <p:sp>
-        <p:nvSpPr>
-          <p:cNvPr id="4" name="Slide Number Placeholder 3">
-            <a:extLst>
-              <a:ext uri="{FF2B5EF4-FFF2-40B4-BE49-F238E27FC236}">
-                <a16:creationId xmlns:a16="http://schemas.microsoft.com/office/drawing/2014/main" id="{5FA3B802-FFC7-497A-92B9-C59E8ABB0694}"/>
-              </a:ext>
-            </a:extLst>
-          </p:cNvPr>
-          <p:cNvSpPr>
-            <a:spLocks noGrp="1"/>
-          </p:cNvSpPr>
-          <p:nvPr>
-            <p:ph type="sldNum" idx="12"/>
-          </p:nvPr>
-        </p:nvSpPr>
-        <p:spPr/>
-        <p:txBody>
-          <a:bodyPr/>
-          <a:lstStyle/>
-          <a:p>
-            <a:pPr marL="0" lvl="0" indent="0" algn="r" rtl="0">
-              <a:spcBef>
-                <a:spcPts val="0"/>
-              </a:spcBef>
-              <a:spcAft>
-                <a:spcPts val="0"/>
-              </a:spcAft>
-              <a:buNone/>
-            </a:pPr>
-            <a:fld id="{00000000-1234-1234-1234-123412341234}" type="slidenum">
-              <a:rPr lang="en-US" smtClean="0"/>
-              <a:t>8</a:t>
-            </a:fld>
-            <a:endParaRPr lang="en-US"/>
-          </a:p>
-        </p:txBody>
-      </p:sp>
-      <p:sp>
-        <p:nvSpPr>
-          <p:cNvPr id="5" name="Rectangle 4">
-            <a:extLst>
-              <a:ext uri="{FF2B5EF4-FFF2-40B4-BE49-F238E27FC236}">
-                <a16:creationId xmlns:a16="http://schemas.microsoft.com/office/drawing/2014/main" id="{F764A644-973F-46ED-82C1-53087C91377A}"/>
-              </a:ext>
-            </a:extLst>
-          </p:cNvPr>
-          <p:cNvSpPr/>
-          <p:nvPr/>
-        </p:nvSpPr>
         <p:spPr>
           <a:xfrm>
-            <a:off x="971421" y="2702257"/>
-            <a:ext cx="6412018" cy="2561166"/>
+            <a:off x="827774" y="1626669"/>
+            <a:ext cx="7584706" cy="4331680"/>
           </a:xfrm>
           <a:prstGeom prst="rect">
             <a:avLst/>
           </a:prstGeom>
+          <a:ln/>
         </p:spPr>
         <p:style>
           <a:lnRef idx="1">
@@ -35954,69 +39341,480 @@
           </a:fontRef>
         </p:style>
         <p:txBody>
-          <a:bodyPr rtlCol="0" anchor="ctr"/>
+          <a:bodyPr spcFirstLastPara="1" wrap="square" lIns="91425" tIns="45700" rIns="91425" bIns="45700" anchor="t" anchorCtr="0">
+            <a:noAutofit/>
+          </a:bodyPr>
           <a:lstStyle/>
           <a:p>
-            <a:pPr lvl="0">
+            <a:pPr marL="0" lvl="0" indent="0" algn="l" rtl="0">
               <a:lnSpc>
                 <a:spcPct val="80000"/>
               </a:lnSpc>
+              <a:spcBef>
+                <a:spcPts val="0"/>
+              </a:spcBef>
+              <a:spcAft>
+                <a:spcPts val="0"/>
+              </a:spcAft>
               <a:buSzPts val="1750"/>
+              <a:buNone/>
             </a:pPr>
             <a:r>
-              <a:rPr lang="en-US" dirty="0">
+              <a:rPr lang="en-US" sz="1750" b="1" dirty="0">
                 <a:latin typeface="Courier New"/>
                 <a:ea typeface="Courier New"/>
                 <a:cs typeface="Courier New"/>
                 <a:sym typeface="Courier New"/>
               </a:rPr>
-              <a:t>public class Animal {</a:t>
+              <a:t>public class</a:t>
             </a:r>
-          </a:p>
-          <a:p>
-            <a:pPr lvl="0">
-              <a:lnSpc>
-                <a:spcPct val="80000"/>
-              </a:lnSpc>
-              <a:buSzPts val="1750"/>
-            </a:pPr>
             <a:r>
-              <a:rPr lang="en-US" dirty="0">
+              <a:rPr lang="en-US" sz="1750" dirty="0">
                 <a:latin typeface="Courier New"/>
                 <a:ea typeface="Courier New"/>
                 <a:cs typeface="Courier New"/>
                 <a:sym typeface="Courier New"/>
               </a:rPr>
-              <a:t>	public void </a:t>
+              <a:t> Dog {</a:t>
             </a:r>
+            <a:endParaRPr dirty="0"/>
+          </a:p>
+          <a:p>
+            <a:pPr marL="0" lvl="0" indent="0" algn="l" rtl="0">
+              <a:lnSpc>
+                <a:spcPct val="80000"/>
+              </a:lnSpc>
+              <a:spcBef>
+                <a:spcPts val="350"/>
+              </a:spcBef>
+              <a:spcAft>
+                <a:spcPts val="0"/>
+              </a:spcAft>
+              <a:buSzPts val="1750"/>
+              <a:buNone/>
+            </a:pPr>
             <a:r>
-              <a:rPr lang="en-US" dirty="0" err="1">
+              <a:rPr lang="en-US" sz="1750" dirty="0">
                 <a:latin typeface="Courier New"/>
                 <a:ea typeface="Courier New"/>
                 <a:cs typeface="Courier New"/>
                 <a:sym typeface="Courier New"/>
               </a:rPr>
-              <a:t>printInfo</a:t>
+              <a:t>	</a:t>
             </a:r>
             <a:r>
-              <a:rPr lang="en-US" dirty="0">
+              <a:rPr lang="en-US" sz="1750" b="1" dirty="0">
                 <a:latin typeface="Courier New"/>
                 <a:ea typeface="Courier New"/>
                 <a:cs typeface="Courier New"/>
                 <a:sym typeface="Courier New"/>
               </a:rPr>
-              <a:t>(){</a:t>
+              <a:t>public</a:t>
             </a:r>
-            <a:br>
-              <a:rPr lang="en-US" dirty="0">
+            <a:r>
+              <a:rPr lang="en-US" sz="1750" dirty="0">
                 <a:latin typeface="Courier New"/>
                 <a:ea typeface="Courier New"/>
                 <a:cs typeface="Courier New"/>
                 <a:sym typeface="Courier New"/>
               </a:rPr>
-            </a:br>
+              <a:t> </a:t>
+            </a:r>
             <a:r>
-              <a:rPr lang="en-US" dirty="0">
+              <a:rPr lang="en-US" sz="1750" b="1" dirty="0">
+                <a:latin typeface="Courier New"/>
+                <a:ea typeface="Courier New"/>
+                <a:cs typeface="Courier New"/>
+                <a:sym typeface="Courier New"/>
+              </a:rPr>
+              <a:t>void</a:t>
+            </a:r>
+            <a:r>
+              <a:rPr lang="en-US" sz="1750" dirty="0">
+                <a:latin typeface="Courier New"/>
+                <a:ea typeface="Courier New"/>
+                <a:cs typeface="Courier New"/>
+                <a:sym typeface="Courier New"/>
+              </a:rPr>
+              <a:t> bark() {}</a:t>
+            </a:r>
+            <a:endParaRPr dirty="0"/>
+          </a:p>
+          <a:p>
+            <a:pPr marL="0" lvl="0" indent="0" algn="l" rtl="0">
+              <a:lnSpc>
+                <a:spcPct val="80000"/>
+              </a:lnSpc>
+              <a:spcBef>
+                <a:spcPts val="350"/>
+              </a:spcBef>
+              <a:spcAft>
+                <a:spcPts val="0"/>
+              </a:spcAft>
+              <a:buSzPts val="1750"/>
+              <a:buNone/>
+            </a:pPr>
+            <a:r>
+              <a:rPr lang="en-US" sz="1750" dirty="0">
+                <a:latin typeface="Courier New"/>
+                <a:ea typeface="Courier New"/>
+                <a:cs typeface="Courier New"/>
+                <a:sym typeface="Courier New"/>
+              </a:rPr>
+              <a:t>}</a:t>
+            </a:r>
+            <a:endParaRPr dirty="0"/>
+          </a:p>
+          <a:p>
+            <a:pPr marL="0" lvl="0" indent="0" algn="l" rtl="0">
+              <a:lnSpc>
+                <a:spcPct val="80000"/>
+              </a:lnSpc>
+              <a:spcBef>
+                <a:spcPts val="350"/>
+              </a:spcBef>
+              <a:spcAft>
+                <a:spcPts val="0"/>
+              </a:spcAft>
+              <a:buSzPts val="1750"/>
+              <a:buNone/>
+            </a:pPr>
+            <a:endParaRPr sz="1750" dirty="0">
+              <a:latin typeface="Courier New"/>
+              <a:ea typeface="Courier New"/>
+              <a:cs typeface="Courier New"/>
+              <a:sym typeface="Courier New"/>
+            </a:endParaRPr>
+          </a:p>
+          <a:p>
+            <a:pPr marL="0" lvl="0" indent="0" algn="l" rtl="0">
+              <a:lnSpc>
+                <a:spcPct val="80000"/>
+              </a:lnSpc>
+              <a:spcBef>
+                <a:spcPts val="350"/>
+              </a:spcBef>
+              <a:spcAft>
+                <a:spcPts val="0"/>
+              </a:spcAft>
+              <a:buSzPts val="1750"/>
+              <a:buNone/>
+            </a:pPr>
+            <a:r>
+              <a:rPr lang="en-US" sz="1750" b="1" dirty="0">
+                <a:latin typeface="Courier New"/>
+                <a:ea typeface="Courier New"/>
+                <a:cs typeface="Courier New"/>
+                <a:sym typeface="Courier New"/>
+              </a:rPr>
+              <a:t>public class</a:t>
+            </a:r>
+            <a:r>
+              <a:rPr lang="en-US" sz="1750" dirty="0">
+                <a:latin typeface="Courier New"/>
+                <a:ea typeface="Courier New"/>
+                <a:cs typeface="Courier New"/>
+                <a:sym typeface="Courier New"/>
+              </a:rPr>
+              <a:t> Dalmatian </a:t>
+            </a:r>
+            <a:r>
+              <a:rPr lang="en-US" sz="1750" b="1" dirty="0">
+                <a:latin typeface="Courier New"/>
+                <a:ea typeface="Courier New"/>
+                <a:cs typeface="Courier New"/>
+                <a:sym typeface="Courier New"/>
+              </a:rPr>
+              <a:t>extends</a:t>
+            </a:r>
+            <a:r>
+              <a:rPr lang="en-US" sz="1750" dirty="0">
+                <a:latin typeface="Courier New"/>
+                <a:ea typeface="Courier New"/>
+                <a:cs typeface="Courier New"/>
+                <a:sym typeface="Courier New"/>
+              </a:rPr>
+              <a:t> Dog {</a:t>
+            </a:r>
+          </a:p>
+          <a:p>
+            <a:pPr marL="0" indent="0">
+              <a:lnSpc>
+                <a:spcPct val="80000"/>
+              </a:lnSpc>
+              <a:spcBef>
+                <a:spcPts val="350"/>
+              </a:spcBef>
+              <a:buSzPts val="1750"/>
+              <a:buNone/>
+            </a:pPr>
+            <a:r>
+              <a:rPr lang="en-US" sz="1750" dirty="0">
+                <a:latin typeface="Courier New"/>
+                <a:ea typeface="Courier New"/>
+                <a:cs typeface="Courier New"/>
+                <a:sym typeface="Courier New"/>
+              </a:rPr>
+              <a:t>	</a:t>
+            </a:r>
+            <a:r>
+              <a:rPr lang="en-US" sz="1750" b="1" dirty="0">
+                <a:latin typeface="Courier New"/>
+                <a:ea typeface="Courier New"/>
+                <a:cs typeface="Courier New"/>
+                <a:sym typeface="Courier New"/>
+              </a:rPr>
+              <a:t>public void</a:t>
+            </a:r>
+            <a:r>
+              <a:rPr lang="en-US" sz="1750" dirty="0">
+                <a:latin typeface="Courier New"/>
+                <a:ea typeface="Courier New"/>
+                <a:cs typeface="Courier New"/>
+                <a:sym typeface="Courier New"/>
+              </a:rPr>
+              <a:t> play() {}</a:t>
+            </a:r>
+          </a:p>
+          <a:p>
+            <a:pPr marL="0" lvl="0" indent="0" algn="l" rtl="0">
+              <a:lnSpc>
+                <a:spcPct val="80000"/>
+              </a:lnSpc>
+              <a:spcBef>
+                <a:spcPts val="350"/>
+              </a:spcBef>
+              <a:spcAft>
+                <a:spcPts val="0"/>
+              </a:spcAft>
+              <a:buSzPts val="1750"/>
+              <a:buNone/>
+            </a:pPr>
+            <a:r>
+              <a:rPr lang="en-US" sz="1750" dirty="0">
+                <a:latin typeface="Courier New"/>
+                <a:ea typeface="Courier New"/>
+                <a:cs typeface="Courier New"/>
+                <a:sym typeface="Courier New"/>
+              </a:rPr>
+              <a:t>}</a:t>
+            </a:r>
+            <a:endParaRPr dirty="0"/>
+          </a:p>
+          <a:p>
+            <a:pPr marL="0" lvl="0" indent="0" algn="l" rtl="0">
+              <a:lnSpc>
+                <a:spcPct val="80000"/>
+              </a:lnSpc>
+              <a:spcBef>
+                <a:spcPts val="350"/>
+              </a:spcBef>
+              <a:spcAft>
+                <a:spcPts val="0"/>
+              </a:spcAft>
+              <a:buSzPts val="1750"/>
+              <a:buNone/>
+            </a:pPr>
+            <a:endParaRPr sz="1750" dirty="0">
+              <a:latin typeface="Courier New"/>
+              <a:ea typeface="Courier New"/>
+              <a:cs typeface="Courier New"/>
+              <a:sym typeface="Courier New"/>
+            </a:endParaRPr>
+          </a:p>
+          <a:p>
+            <a:pPr marL="0" lvl="0" indent="0" algn="l" rtl="0">
+              <a:lnSpc>
+                <a:spcPct val="80000"/>
+              </a:lnSpc>
+              <a:spcBef>
+                <a:spcPts val="350"/>
+              </a:spcBef>
+              <a:spcAft>
+                <a:spcPts val="0"/>
+              </a:spcAft>
+              <a:buSzPts val="1750"/>
+              <a:buNone/>
+            </a:pPr>
+            <a:r>
+              <a:rPr lang="en-US" sz="1750" b="1" dirty="0">
+                <a:latin typeface="Courier New"/>
+                <a:ea typeface="Courier New"/>
+                <a:cs typeface="Courier New"/>
+                <a:sym typeface="Courier New"/>
+              </a:rPr>
+              <a:t>public class</a:t>
+            </a:r>
+            <a:r>
+              <a:rPr lang="en-US" sz="1750" dirty="0">
+                <a:latin typeface="Courier New"/>
+                <a:ea typeface="Courier New"/>
+                <a:cs typeface="Courier New"/>
+                <a:sym typeface="Courier New"/>
+              </a:rPr>
+              <a:t> Simulator {</a:t>
+            </a:r>
+            <a:endParaRPr dirty="0"/>
+          </a:p>
+          <a:p>
+            <a:pPr marL="0" lvl="0" indent="0" algn="l" rtl="0">
+              <a:lnSpc>
+                <a:spcPct val="80000"/>
+              </a:lnSpc>
+              <a:spcBef>
+                <a:spcPts val="350"/>
+              </a:spcBef>
+              <a:spcAft>
+                <a:spcPts val="0"/>
+              </a:spcAft>
+              <a:buSzPts val="1750"/>
+              <a:buNone/>
+            </a:pPr>
+            <a:r>
+              <a:rPr lang="en-US" sz="1750" dirty="0">
+                <a:latin typeface="Courier New"/>
+                <a:ea typeface="Courier New"/>
+                <a:cs typeface="Courier New"/>
+                <a:sym typeface="Courier New"/>
+              </a:rPr>
+              <a:t>	</a:t>
+            </a:r>
+            <a:r>
+              <a:rPr lang="en-US" sz="1750" b="1" dirty="0">
+                <a:latin typeface="Courier New"/>
+                <a:ea typeface="Courier New"/>
+                <a:cs typeface="Courier New"/>
+                <a:sym typeface="Courier New"/>
+              </a:rPr>
+              <a:t>public static void</a:t>
+            </a:r>
+            <a:r>
+              <a:rPr lang="en-US" sz="1750" dirty="0">
+                <a:latin typeface="Courier New"/>
+                <a:ea typeface="Courier New"/>
+                <a:cs typeface="Courier New"/>
+                <a:sym typeface="Courier New"/>
+              </a:rPr>
+              <a:t> main(String[] </a:t>
+            </a:r>
+            <a:r>
+              <a:rPr lang="en-US" sz="1750" dirty="0" err="1">
+                <a:latin typeface="Courier New"/>
+                <a:ea typeface="Courier New"/>
+                <a:cs typeface="Courier New"/>
+                <a:sym typeface="Courier New"/>
+              </a:rPr>
+              <a:t>args</a:t>
+            </a:r>
+            <a:r>
+              <a:rPr lang="en-US" sz="1750" dirty="0">
+                <a:latin typeface="Courier New"/>
+                <a:ea typeface="Courier New"/>
+                <a:cs typeface="Courier New"/>
+                <a:sym typeface="Courier New"/>
+              </a:rPr>
+              <a:t>) {</a:t>
+            </a:r>
+            <a:endParaRPr dirty="0"/>
+          </a:p>
+          <a:p>
+            <a:pPr marL="0" lvl="0" indent="0" algn="l" rtl="0">
+              <a:lnSpc>
+                <a:spcPct val="80000"/>
+              </a:lnSpc>
+              <a:spcBef>
+                <a:spcPts val="350"/>
+              </a:spcBef>
+              <a:spcAft>
+                <a:spcPts val="0"/>
+              </a:spcAft>
+              <a:buSzPts val="1750"/>
+              <a:buNone/>
+            </a:pPr>
+            <a:r>
+              <a:rPr lang="en-US" sz="1750" dirty="0">
+                <a:latin typeface="Courier New"/>
+                <a:ea typeface="Courier New"/>
+                <a:cs typeface="Courier New"/>
+                <a:sym typeface="Courier New"/>
+              </a:rPr>
+              <a:t>		Dog </a:t>
+            </a:r>
+            <a:r>
+              <a:rPr lang="en-US" sz="1750" dirty="0" err="1">
+                <a:latin typeface="Courier New"/>
+                <a:ea typeface="Courier New"/>
+                <a:cs typeface="Courier New"/>
+                <a:sym typeface="Courier New"/>
+              </a:rPr>
+              <a:t>myDog</a:t>
+            </a:r>
+            <a:r>
+              <a:rPr lang="en-US" sz="1750" dirty="0">
+                <a:latin typeface="Courier New"/>
+                <a:ea typeface="Courier New"/>
+                <a:cs typeface="Courier New"/>
+                <a:sym typeface="Courier New"/>
+              </a:rPr>
+              <a:t> = </a:t>
+            </a:r>
+            <a:r>
+              <a:rPr lang="en-US" sz="1750" b="1" dirty="0">
+                <a:latin typeface="Courier New"/>
+                <a:ea typeface="Courier New"/>
+                <a:cs typeface="Courier New"/>
+                <a:sym typeface="Courier New"/>
+              </a:rPr>
+              <a:t>new</a:t>
+            </a:r>
+            <a:r>
+              <a:rPr lang="en-US" sz="1750" dirty="0">
+                <a:latin typeface="Courier New"/>
+                <a:ea typeface="Courier New"/>
+                <a:cs typeface="Courier New"/>
+                <a:sym typeface="Courier New"/>
+              </a:rPr>
+              <a:t> Dalmatian();</a:t>
+            </a:r>
+            <a:endParaRPr dirty="0"/>
+          </a:p>
+          <a:p>
+            <a:pPr marL="0" lvl="0" indent="0" algn="l" rtl="0">
+              <a:lnSpc>
+                <a:spcPct val="80000"/>
+              </a:lnSpc>
+              <a:spcBef>
+                <a:spcPts val="350"/>
+              </a:spcBef>
+              <a:spcAft>
+                <a:spcPts val="0"/>
+              </a:spcAft>
+              <a:buSzPts val="1750"/>
+              <a:buNone/>
+            </a:pPr>
+            <a:endParaRPr sz="1750" dirty="0">
+              <a:latin typeface="Courier New"/>
+              <a:ea typeface="Courier New"/>
+              <a:cs typeface="Courier New"/>
+              <a:sym typeface="Courier New"/>
+            </a:endParaRPr>
+          </a:p>
+          <a:p>
+            <a:pPr marL="0" lvl="0" indent="0" algn="l" rtl="0">
+              <a:lnSpc>
+                <a:spcPct val="80000"/>
+              </a:lnSpc>
+              <a:spcBef>
+                <a:spcPts val="350"/>
+              </a:spcBef>
+              <a:spcAft>
+                <a:spcPts val="0"/>
+              </a:spcAft>
+              <a:buSzPts val="1750"/>
+              <a:buNone/>
+            </a:pPr>
+            <a:r>
+              <a:rPr lang="en-US" sz="1750" dirty="0">
                 <a:latin typeface="Courier New"/>
                 <a:ea typeface="Courier New"/>
                 <a:cs typeface="Courier New"/>
@@ -36025,33 +39823,83 @@
               <a:t>		</a:t>
             </a:r>
             <a:r>
-              <a:rPr lang="en-US" dirty="0" err="1">
+              <a:rPr lang="en-US" sz="1750" dirty="0" err="1">
                 <a:latin typeface="Courier New"/>
                 <a:ea typeface="Courier New"/>
                 <a:cs typeface="Courier New"/>
                 <a:sym typeface="Courier New"/>
               </a:rPr>
-              <a:t>System.out.println</a:t>
+              <a:t>myDog.bark</a:t>
             </a:r>
             <a:r>
-              <a:rPr lang="en-US" dirty="0">
+              <a:rPr lang="en-US" sz="1750" dirty="0">
                 <a:latin typeface="Courier New"/>
                 <a:ea typeface="Courier New"/>
                 <a:cs typeface="Courier New"/>
                 <a:sym typeface="Courier New"/>
               </a:rPr>
-              <a:t>(“Print info”);</a:t>
+              <a:t>();</a:t>
             </a:r>
-            <a:br>
-              <a:rPr lang="en-US" dirty="0">
+            <a:endParaRPr dirty="0"/>
+          </a:p>
+          <a:p>
+            <a:pPr marL="0" lvl="0" indent="0" algn="l" rtl="0">
+              <a:lnSpc>
+                <a:spcPct val="80000"/>
+              </a:lnSpc>
+              <a:spcBef>
+                <a:spcPts val="350"/>
+              </a:spcBef>
+              <a:spcAft>
+                <a:spcPts val="0"/>
+              </a:spcAft>
+              <a:buSzPts val="1750"/>
+              <a:buNone/>
+            </a:pPr>
+            <a:r>
+              <a:rPr lang="en-US" sz="1750" dirty="0">
                 <a:latin typeface="Courier New"/>
                 <a:ea typeface="Courier New"/>
                 <a:cs typeface="Courier New"/>
                 <a:sym typeface="Courier New"/>
               </a:rPr>
-            </a:br>
+              <a:t>		((Dalmatian) </a:t>
+            </a:r>
             <a:r>
-              <a:rPr lang="en-US" dirty="0">
+              <a:rPr lang="en-US" sz="1750" dirty="0" err="1">
+                <a:latin typeface="Courier New"/>
+                <a:ea typeface="Courier New"/>
+                <a:cs typeface="Courier New"/>
+                <a:sym typeface="Courier New"/>
+              </a:rPr>
+              <a:t>myDog</a:t>
+            </a:r>
+            <a:r>
+              <a:rPr lang="en-US" sz="1750" dirty="0">
+                <a:latin typeface="Courier New"/>
+                <a:ea typeface="Courier New"/>
+                <a:cs typeface="Courier New"/>
+                <a:sym typeface="Courier New"/>
+              </a:rPr>
+              <a:t>).play();</a:t>
+            </a:r>
+          </a:p>
+          <a:p>
+            <a:pPr marL="0" lvl="0" indent="0" algn="l" rtl="0">
+              <a:lnSpc>
+                <a:spcPct val="80000"/>
+              </a:lnSpc>
+              <a:spcBef>
+                <a:spcPts val="350"/>
+              </a:spcBef>
+              <a:spcAft>
+                <a:spcPts val="0"/>
+              </a:spcAft>
+              <a:buSzPts val="1750"/>
+              <a:buNone/>
+            </a:pPr>
+            <a:r>
+              <a:rPr lang="en-US" sz="1750" dirty="0">
                 <a:latin typeface="Courier New"/>
                 <a:ea typeface="Courier New"/>
                 <a:cs typeface="Courier New"/>
@@ -36059,138 +39907,24 @@
               </a:rPr>
               <a:t>	}</a:t>
             </a:r>
+            <a:endParaRPr dirty="0"/>
           </a:p>
           <a:p>
-            <a:pPr lvl="0">
+            <a:pPr marL="0" lvl="0" indent="0" algn="l" rtl="0">
               <a:lnSpc>
                 <a:spcPct val="80000"/>
               </a:lnSpc>
+              <a:spcBef>
+                <a:spcPts val="350"/>
+              </a:spcBef>
+              <a:spcAft>
+                <a:spcPts val="0"/>
+              </a:spcAft>
               <a:buSzPts val="1750"/>
+              <a:buNone/>
             </a:pPr>
             <a:r>
-              <a:rPr lang="en-US" dirty="0">
-                <a:latin typeface="Courier New"/>
-                <a:ea typeface="Courier New"/>
-                <a:cs typeface="Courier New"/>
-                <a:sym typeface="Courier New"/>
-              </a:rPr>
-              <a:t>	</a:t>
-            </a:r>
-          </a:p>
-          <a:p>
-            <a:pPr lvl="0">
-              <a:lnSpc>
-                <a:spcPct val="80000"/>
-              </a:lnSpc>
-              <a:buSzPts val="1750"/>
-            </a:pPr>
-            <a:r>
-              <a:rPr lang="en-US" dirty="0">
-                <a:latin typeface="Courier New"/>
-                <a:ea typeface="Courier New"/>
-                <a:cs typeface="Courier New"/>
-                <a:sym typeface="Courier New"/>
-              </a:rPr>
-              <a:t>	public void </a:t>
-            </a:r>
-            <a:r>
-              <a:rPr lang="en-US" dirty="0" err="1">
-                <a:latin typeface="Courier New"/>
-                <a:ea typeface="Courier New"/>
-                <a:cs typeface="Courier New"/>
-                <a:sym typeface="Courier New"/>
-              </a:rPr>
-              <a:t>printInfo</a:t>
-            </a:r>
-            <a:r>
-              <a:rPr lang="en-US" dirty="0">
-                <a:latin typeface="Courier New"/>
-                <a:ea typeface="Courier New"/>
-                <a:cs typeface="Courier New"/>
-                <a:sym typeface="Courier New"/>
-              </a:rPr>
-              <a:t>(</a:t>
-            </a:r>
-            <a:r>
-              <a:rPr lang="en-US" b="1" dirty="0">
-                <a:latin typeface="Courier New"/>
-                <a:ea typeface="Courier New"/>
-                <a:cs typeface="Courier New"/>
-                <a:sym typeface="Courier New"/>
-              </a:rPr>
-              <a:t>String s</a:t>
-            </a:r>
-            <a:r>
-              <a:rPr lang="en-US" dirty="0">
-                <a:latin typeface="Courier New"/>
-                <a:ea typeface="Courier New"/>
-                <a:cs typeface="Courier New"/>
-                <a:sym typeface="Courier New"/>
-              </a:rPr>
-              <a:t>){</a:t>
-            </a:r>
-            <a:br>
-              <a:rPr lang="en-US" dirty="0">
-                <a:latin typeface="Courier New"/>
-                <a:ea typeface="Courier New"/>
-                <a:cs typeface="Courier New"/>
-                <a:sym typeface="Courier New"/>
-              </a:rPr>
-            </a:br>
-            <a:r>
-              <a:rPr lang="en-US" dirty="0">
-                <a:latin typeface="Courier New"/>
-                <a:ea typeface="Courier New"/>
-                <a:cs typeface="Courier New"/>
-                <a:sym typeface="Courier New"/>
-              </a:rPr>
-              <a:t>		 </a:t>
-            </a:r>
-            <a:r>
-              <a:rPr lang="en-US" dirty="0" err="1">
-                <a:latin typeface="Courier New"/>
-                <a:ea typeface="Courier New"/>
-                <a:cs typeface="Courier New"/>
-                <a:sym typeface="Courier New"/>
-              </a:rPr>
-              <a:t>System.out.println</a:t>
-            </a:r>
-            <a:r>
-              <a:rPr lang="en-US" dirty="0">
-                <a:latin typeface="Courier New"/>
-                <a:ea typeface="Courier New"/>
-                <a:cs typeface="Courier New"/>
-                <a:sym typeface="Courier New"/>
-              </a:rPr>
-              <a:t>(“Print info: ”+s);</a:t>
-            </a:r>
-            <a:br>
-              <a:rPr lang="en-US" dirty="0">
-                <a:latin typeface="Courier New"/>
-                <a:ea typeface="Courier New"/>
-                <a:cs typeface="Courier New"/>
-                <a:sym typeface="Courier New"/>
-              </a:rPr>
-            </a:br>
-            <a:r>
-              <a:rPr lang="en-US" dirty="0">
-                <a:latin typeface="Courier New"/>
-                <a:ea typeface="Courier New"/>
-                <a:cs typeface="Courier New"/>
-                <a:sym typeface="Courier New"/>
-              </a:rPr>
-              <a:t>	}</a:t>
-            </a:r>
-          </a:p>
-          <a:p>
-            <a:pPr lvl="0">
-              <a:lnSpc>
-                <a:spcPct val="80000"/>
-              </a:lnSpc>
-              <a:buSzPts val="1750"/>
-            </a:pPr>
-            <a:r>
-              <a:rPr lang="en-US" dirty="0">
+              <a:rPr lang="en-US" sz="1750" dirty="0">
                 <a:latin typeface="Courier New"/>
                 <a:ea typeface="Courier New"/>
                 <a:cs typeface="Courier New"/>
@@ -36198,119 +39932,61 @@
               </a:rPr>
               <a:t>}</a:t>
             </a:r>
-            <a:endParaRPr lang="en-US" dirty="0"/>
+            <a:endParaRPr dirty="0"/>
           </a:p>
+        </p:txBody>
+      </p:sp>
+      <p:sp>
+        <p:nvSpPr>
+          <p:cNvPr id="227" name="Google Shape;227;p17"/>
+          <p:cNvSpPr txBox="1">
+            <a:spLocks noGrp="1"/>
+          </p:cNvSpPr>
+          <p:nvPr>
+            <p:ph type="sldNum" idx="12"/>
+          </p:nvPr>
+        </p:nvSpPr>
+        <p:spPr>
+          <a:xfrm>
+            <a:off x="8122757" y="6363712"/>
+            <a:ext cx="861671" cy="365125"/>
+          </a:xfrm>
+          <a:prstGeom prst="rect">
+            <a:avLst/>
+          </a:prstGeom>
+          <a:noFill/>
+          <a:ln>
+            <a:noFill/>
+          </a:ln>
+        </p:spPr>
+        <p:txBody>
+          <a:bodyPr spcFirstLastPara="1" wrap="square" lIns="91425" tIns="45700" rIns="91425" bIns="45700" anchor="ctr" anchorCtr="0">
+            <a:noAutofit/>
+          </a:bodyPr>
+          <a:lstStyle/>
           <a:p>
-            <a:pPr lvl="0">
-              <a:lnSpc>
-                <a:spcPct val="80000"/>
-              </a:lnSpc>
-              <a:spcBef>
-                <a:spcPts val="350"/>
-              </a:spcBef>
-              <a:buSzPts val="1750"/>
+            <a:pPr marL="0" lvl="0" indent="0" algn="r" rtl="0">
+              <a:spcBef>
+                <a:spcPts val="0"/>
+              </a:spcBef>
+              <a:spcAft>
+                <a:spcPts val="0"/>
+              </a:spcAft>
+              <a:buNone/>
             </a:pPr>
-            <a:endParaRPr lang="en-US" dirty="0">
-              <a:latin typeface="Courier New"/>
-              <a:ea typeface="Courier New"/>
-              <a:cs typeface="Courier New"/>
-              <a:sym typeface="Courier New"/>
-            </a:endParaRPr>
-          </a:p>
-          <a:p>
-            <a:pPr algn="ctr"/>
-            <a:endParaRPr lang="en-US" dirty="0"/>
+            <a:fld id="{00000000-1234-1234-1234-123412341234}" type="slidenum">
+              <a:rPr lang="en-US"/>
+              <a:t>8</a:t>
+            </a:fld>
+            <a:endParaRPr/>
           </a:p>
         </p:txBody>
       </p:sp>
     </p:spTree>
-    <p:extLst>
-      <p:ext uri="{BB962C8B-B14F-4D97-AF65-F5344CB8AC3E}">
-        <p14:creationId xmlns:p14="http://schemas.microsoft.com/office/powerpoint/2010/main" val="2975078769"/>
-      </p:ext>
-    </p:extLst>
   </p:cSld>
   <p:clrMapOvr>
     <a:masterClrMapping/>
   </p:clrMapOvr>
-  <p:timing>
-    <p:tnLst>
-      <p:par>
-        <p:cTn id="1" dur="indefinite" restart="never" nodeType="tmRoot">
-          <p:childTnLst>
-            <p:seq concurrent="1" nextAc="seek">
-              <p:cTn id="2" dur="indefinite" nodeType="mainSeq">
-                <p:childTnLst>
-                  <p:par>
-                    <p:cTn id="3" fill="hold">
-                      <p:stCondLst>
-                        <p:cond delay="indefinite"/>
-                      </p:stCondLst>
-                      <p:childTnLst>
-                        <p:par>
-                          <p:cTn id="4" fill="hold">
-                            <p:stCondLst>
-                              <p:cond delay="0"/>
-                            </p:stCondLst>
-                            <p:childTnLst>
-                              <p:par>
-                                <p:cTn id="5" presetID="1" presetClass="entr" presetSubtype="0" fill="hold" grpId="0" nodeType="clickEffect">
-                                  <p:stCondLst>
-                                    <p:cond delay="0"/>
-                                  </p:stCondLst>
-                                  <p:childTnLst>
-                                    <p:set>
-                                      <p:cBhvr>
-                                        <p:cTn id="6" dur="1" fill="hold">
-                                          <p:stCondLst>
-                                            <p:cond delay="0"/>
-                                          </p:stCondLst>
-                                        </p:cTn>
-                                        <p:tgtEl>
-                                          <p:spTgt spid="5"/>
-                                        </p:tgtEl>
-                                        <p:attrNameLst>
-                                          <p:attrName>style.visibility</p:attrName>
-                                        </p:attrNameLst>
-                                      </p:cBhvr>
-                                      <p:to>
-                                        <p:strVal val="visible"/>
-                                      </p:to>
-                                    </p:set>
-                                  </p:childTnLst>
-                                </p:cTn>
-                              </p:par>
-                            </p:childTnLst>
-                          </p:cTn>
-                        </p:par>
-                      </p:childTnLst>
-                    </p:cTn>
-                  </p:par>
-                </p:childTnLst>
-              </p:cTn>
-              <p:prevCondLst>
-                <p:cond evt="onPrev" delay="0">
-                  <p:tgtEl>
-                    <p:sldTgt/>
-                  </p:tgtEl>
-                </p:cond>
-              </p:prevCondLst>
-              <p:nextCondLst>
-                <p:cond evt="onNext" delay="0">
-                  <p:tgtEl>
-                    <p:sldTgt/>
-                  </p:tgtEl>
-                </p:cond>
-              </p:nextCondLst>
-            </p:seq>
-          </p:childTnLst>
-        </p:cTn>
-      </p:par>
-    </p:tnLst>
-    <p:bldLst>
-      <p:bldP spid="5" grpId="0" animBg="1"/>
-    </p:bldLst>
-  </p:timing>
 </p:sld>
 </file>
 

</xml_diff>